<commit_message>
Exercícios aula 2 adicionados
</commit_message>
<xml_diff>
--- a/Aula 1/Apresentação da Disciplina.pptx
+++ b/Aula 1/Apresentação da Disciplina.pptx
@@ -2,14 +2,19 @@
 <file path=ppt/presentation.xml><?xml version="1.0" encoding="utf-8"?>
 <p:presentation xmlns:a="http://schemas.openxmlformats.org/drawingml/2006/main" xmlns:r="http://schemas.openxmlformats.org/officeDocument/2006/relationships" xmlns:p="http://schemas.openxmlformats.org/presentationml/2006/main" saveSubsetFonts="1">
   <p:sldMasterIdLst>
-    <p:sldMasterId id="2147483648" r:id="rId1"/>
+    <p:sldMasterId id="2147483648" r:id="rId4"/>
   </p:sldMasterIdLst>
+  <p:notesMasterIdLst>
+    <p:notesMasterId r:id="rId12"/>
+  </p:notesMasterIdLst>
   <p:sldIdLst>
-    <p:sldId id="256" r:id="rId2"/>
-    <p:sldId id="257" r:id="rId3"/>
-    <p:sldId id="259" r:id="rId4"/>
-    <p:sldId id="260" r:id="rId5"/>
-    <p:sldId id="261" r:id="rId6"/>
+    <p:sldId id="256" r:id="rId5"/>
+    <p:sldId id="257" r:id="rId6"/>
+    <p:sldId id="259" r:id="rId7"/>
+    <p:sldId id="262" r:id="rId8"/>
+    <p:sldId id="260" r:id="rId9"/>
+    <p:sldId id="261" r:id="rId10"/>
+    <p:sldId id="275" r:id="rId11"/>
   </p:sldIdLst>
   <p:sldSz cx="12192000" cy="6858000"/>
   <p:notesSz cx="6858000" cy="9144000"/>
@@ -116,6 +121,447 @@
 </p:presentation>
 </file>
 
+<file path=ppt/revisionInfo.xml><?xml version="1.0" encoding="utf-8"?>
+<p1510:revInfo xmlns:a="http://schemas.openxmlformats.org/drawingml/2006/main" xmlns:r="http://schemas.openxmlformats.org/officeDocument/2006/relationships" xmlns:p1510="http://schemas.microsoft.com/office/powerpoint/2015/10/main">
+  <p1510:revLst>
+    <p1510:client id="{8AB787FA-9BFB-B50A-AC02-F78A0F0ED00E}" v="30" dt="2025-07-30T14:25:04.486"/>
+  </p1510:revLst>
+</p1510:revInfo>
+</file>
+
+<file path=ppt/notesMasters/notesMaster1.xml><?xml version="1.0" encoding="utf-8"?>
+<p:notesMaster xmlns:a="http://schemas.openxmlformats.org/drawingml/2006/main" xmlns:r="http://schemas.openxmlformats.org/officeDocument/2006/relationships" xmlns:p="http://schemas.openxmlformats.org/presentationml/2006/main">
+  <p:cSld>
+    <p:bg>
+      <p:bgRef idx="1001">
+        <a:schemeClr val="bg1"/>
+      </p:bgRef>
+    </p:bg>
+    <p:spTree>
+      <p:nvGrpSpPr>
+        <p:cNvPr id="1" name=""/>
+        <p:cNvGrpSpPr/>
+        <p:nvPr/>
+      </p:nvGrpSpPr>
+      <p:grpSpPr>
+        <a:xfrm>
+          <a:off x="0" y="0"/>
+          <a:ext cx="0" cy="0"/>
+          <a:chOff x="0" y="0"/>
+          <a:chExt cx="0" cy="0"/>
+        </a:xfrm>
+      </p:grpSpPr>
+      <p:sp>
+        <p:nvSpPr>
+          <p:cNvPr id="2" name="Espaço Reservado para Cabeçalho 1"/>
+          <p:cNvSpPr>
+            <a:spLocks noGrp="1"/>
+          </p:cNvSpPr>
+          <p:nvPr>
+            <p:ph type="hdr" sz="quarter"/>
+          </p:nvPr>
+        </p:nvSpPr>
+        <p:spPr>
+          <a:xfrm>
+            <a:off x="0" y="0"/>
+            <a:ext cx="2971800" cy="458788"/>
+          </a:xfrm>
+          <a:prstGeom prst="rect">
+            <a:avLst/>
+          </a:prstGeom>
+        </p:spPr>
+        <p:txBody>
+          <a:bodyPr vert="horz" lIns="91440" tIns="45720" rIns="91440" bIns="45720" rtlCol="0"/>
+          <a:lstStyle>
+            <a:lvl1pPr algn="l">
+              <a:defRPr sz="1200"/>
+            </a:lvl1pPr>
+          </a:lstStyle>
+          <a:p>
+            <a:endParaRPr lang="pt-BR"/>
+          </a:p>
+        </p:txBody>
+      </p:sp>
+      <p:sp>
+        <p:nvSpPr>
+          <p:cNvPr id="3" name="Espaço Reservado para Data 2"/>
+          <p:cNvSpPr>
+            <a:spLocks noGrp="1"/>
+          </p:cNvSpPr>
+          <p:nvPr>
+            <p:ph type="dt" idx="1"/>
+          </p:nvPr>
+        </p:nvSpPr>
+        <p:spPr>
+          <a:xfrm>
+            <a:off x="3884613" y="0"/>
+            <a:ext cx="2971800" cy="458788"/>
+          </a:xfrm>
+          <a:prstGeom prst="rect">
+            <a:avLst/>
+          </a:prstGeom>
+        </p:spPr>
+        <p:txBody>
+          <a:bodyPr vert="horz" lIns="91440" tIns="45720" rIns="91440" bIns="45720" rtlCol="0"/>
+          <a:lstStyle>
+            <a:lvl1pPr algn="r">
+              <a:defRPr sz="1200"/>
+            </a:lvl1pPr>
+          </a:lstStyle>
+          <a:p>
+            <a:fld id="{81867862-F293-410A-9EF8-8D63CAE1D586}" type="datetimeFigureOut">
+              <a:rPr lang="pt-BR" smtClean="0"/>
+              <a:t>07/08/2025</a:t>
+            </a:fld>
+            <a:endParaRPr lang="pt-BR"/>
+          </a:p>
+        </p:txBody>
+      </p:sp>
+      <p:sp>
+        <p:nvSpPr>
+          <p:cNvPr id="4" name="Espaço Reservado para Imagem de Slide 3"/>
+          <p:cNvSpPr>
+            <a:spLocks noGrp="1" noRot="1" noChangeAspect="1"/>
+          </p:cNvSpPr>
+          <p:nvPr>
+            <p:ph type="sldImg" idx="2"/>
+          </p:nvPr>
+        </p:nvSpPr>
+        <p:spPr>
+          <a:xfrm>
+            <a:off x="685800" y="1143000"/>
+            <a:ext cx="5486400" cy="3086100"/>
+          </a:xfrm>
+          <a:prstGeom prst="rect">
+            <a:avLst/>
+          </a:prstGeom>
+          <a:noFill/>
+          <a:ln w="12700">
+            <a:solidFill>
+              <a:prstClr val="black"/>
+            </a:solidFill>
+          </a:ln>
+        </p:spPr>
+        <p:txBody>
+          <a:bodyPr vert="horz" lIns="91440" tIns="45720" rIns="91440" bIns="45720" rtlCol="0" anchor="ctr"/>
+          <a:lstStyle/>
+          <a:p>
+            <a:endParaRPr lang="pt-BR"/>
+          </a:p>
+        </p:txBody>
+      </p:sp>
+      <p:sp>
+        <p:nvSpPr>
+          <p:cNvPr id="5" name="Espaço Reservado para Anotações 4"/>
+          <p:cNvSpPr>
+            <a:spLocks noGrp="1"/>
+          </p:cNvSpPr>
+          <p:nvPr>
+            <p:ph type="body" sz="quarter" idx="3"/>
+          </p:nvPr>
+        </p:nvSpPr>
+        <p:spPr>
+          <a:xfrm>
+            <a:off x="685800" y="4400550"/>
+            <a:ext cx="5486400" cy="3600450"/>
+          </a:xfrm>
+          <a:prstGeom prst="rect">
+            <a:avLst/>
+          </a:prstGeom>
+        </p:spPr>
+        <p:txBody>
+          <a:bodyPr vert="horz" lIns="91440" tIns="45720" rIns="91440" bIns="45720" rtlCol="0"/>
+          <a:lstStyle/>
+          <a:p>
+            <a:pPr lvl="0"/>
+            <a:r>
+              <a:rPr lang="pt-BR"/>
+              <a:t>Clique para editar os estilos de texto Mestres</a:t>
+            </a:r>
+          </a:p>
+          <a:p>
+            <a:pPr lvl="1"/>
+            <a:r>
+              <a:rPr lang="pt-BR"/>
+              <a:t>Segundo nível</a:t>
+            </a:r>
+          </a:p>
+          <a:p>
+            <a:pPr lvl="2"/>
+            <a:r>
+              <a:rPr lang="pt-BR"/>
+              <a:t>Terceiro nível</a:t>
+            </a:r>
+          </a:p>
+          <a:p>
+            <a:pPr lvl="3"/>
+            <a:r>
+              <a:rPr lang="pt-BR"/>
+              <a:t>Quarto nível</a:t>
+            </a:r>
+          </a:p>
+          <a:p>
+            <a:pPr lvl="4"/>
+            <a:r>
+              <a:rPr lang="pt-BR"/>
+              <a:t>Quinto nível</a:t>
+            </a:r>
+          </a:p>
+        </p:txBody>
+      </p:sp>
+      <p:sp>
+        <p:nvSpPr>
+          <p:cNvPr id="6" name="Espaço Reservado para Rodapé 5"/>
+          <p:cNvSpPr>
+            <a:spLocks noGrp="1"/>
+          </p:cNvSpPr>
+          <p:nvPr>
+            <p:ph type="ftr" sz="quarter" idx="4"/>
+          </p:nvPr>
+        </p:nvSpPr>
+        <p:spPr>
+          <a:xfrm>
+            <a:off x="0" y="8685213"/>
+            <a:ext cx="2971800" cy="458787"/>
+          </a:xfrm>
+          <a:prstGeom prst="rect">
+            <a:avLst/>
+          </a:prstGeom>
+        </p:spPr>
+        <p:txBody>
+          <a:bodyPr vert="horz" lIns="91440" tIns="45720" rIns="91440" bIns="45720" rtlCol="0" anchor="b"/>
+          <a:lstStyle>
+            <a:lvl1pPr algn="l">
+              <a:defRPr sz="1200"/>
+            </a:lvl1pPr>
+          </a:lstStyle>
+          <a:p>
+            <a:endParaRPr lang="pt-BR"/>
+          </a:p>
+        </p:txBody>
+      </p:sp>
+      <p:sp>
+        <p:nvSpPr>
+          <p:cNvPr id="7" name="Espaço Reservado para Número de Slide 6"/>
+          <p:cNvSpPr>
+            <a:spLocks noGrp="1"/>
+          </p:cNvSpPr>
+          <p:nvPr>
+            <p:ph type="sldNum" sz="quarter" idx="5"/>
+          </p:nvPr>
+        </p:nvSpPr>
+        <p:spPr>
+          <a:xfrm>
+            <a:off x="3884613" y="8685213"/>
+            <a:ext cx="2971800" cy="458787"/>
+          </a:xfrm>
+          <a:prstGeom prst="rect">
+            <a:avLst/>
+          </a:prstGeom>
+        </p:spPr>
+        <p:txBody>
+          <a:bodyPr vert="horz" lIns="91440" tIns="45720" rIns="91440" bIns="45720" rtlCol="0" anchor="b"/>
+          <a:lstStyle>
+            <a:lvl1pPr algn="r">
+              <a:defRPr sz="1200"/>
+            </a:lvl1pPr>
+          </a:lstStyle>
+          <a:p>
+            <a:fld id="{52881FBC-753B-4899-B442-9DAD17B0F056}" type="slidenum">
+              <a:rPr lang="pt-BR" smtClean="0"/>
+              <a:t>‹nº›</a:t>
+            </a:fld>
+            <a:endParaRPr lang="pt-BR"/>
+          </a:p>
+        </p:txBody>
+      </p:sp>
+    </p:spTree>
+    <p:extLst>
+      <p:ext uri="{BB962C8B-B14F-4D97-AF65-F5344CB8AC3E}">
+        <p14:creationId xmlns:p14="http://schemas.microsoft.com/office/powerpoint/2010/main" val="2544255751"/>
+      </p:ext>
+    </p:extLst>
+  </p:cSld>
+  <p:clrMap bg1="lt1" tx1="dk1" bg2="lt2" tx2="dk2" accent1="accent1" accent2="accent2" accent3="accent3" accent4="accent4" accent5="accent5" accent6="accent6" hlink="hlink" folHlink="folHlink"/>
+  <p:notesStyle>
+    <a:lvl1pPr marL="0" algn="l" defTabSz="914400" rtl="0" eaLnBrk="1" latinLnBrk="0" hangingPunct="1">
+      <a:defRPr sz="1200" kern="1200">
+        <a:solidFill>
+          <a:schemeClr val="tx1"/>
+        </a:solidFill>
+        <a:latin typeface="+mn-lt"/>
+        <a:ea typeface="+mn-ea"/>
+        <a:cs typeface="+mn-cs"/>
+      </a:defRPr>
+    </a:lvl1pPr>
+    <a:lvl2pPr marL="457200" algn="l" defTabSz="914400" rtl="0" eaLnBrk="1" latinLnBrk="0" hangingPunct="1">
+      <a:defRPr sz="1200" kern="1200">
+        <a:solidFill>
+          <a:schemeClr val="tx1"/>
+        </a:solidFill>
+        <a:latin typeface="+mn-lt"/>
+        <a:ea typeface="+mn-ea"/>
+        <a:cs typeface="+mn-cs"/>
+      </a:defRPr>
+    </a:lvl2pPr>
+    <a:lvl3pPr marL="914400" algn="l" defTabSz="914400" rtl="0" eaLnBrk="1" latinLnBrk="0" hangingPunct="1">
+      <a:defRPr sz="1200" kern="1200">
+        <a:solidFill>
+          <a:schemeClr val="tx1"/>
+        </a:solidFill>
+        <a:latin typeface="+mn-lt"/>
+        <a:ea typeface="+mn-ea"/>
+        <a:cs typeface="+mn-cs"/>
+      </a:defRPr>
+    </a:lvl3pPr>
+    <a:lvl4pPr marL="1371600" algn="l" defTabSz="914400" rtl="0" eaLnBrk="1" latinLnBrk="0" hangingPunct="1">
+      <a:defRPr sz="1200" kern="1200">
+        <a:solidFill>
+          <a:schemeClr val="tx1"/>
+        </a:solidFill>
+        <a:latin typeface="+mn-lt"/>
+        <a:ea typeface="+mn-ea"/>
+        <a:cs typeface="+mn-cs"/>
+      </a:defRPr>
+    </a:lvl4pPr>
+    <a:lvl5pPr marL="1828800" algn="l" defTabSz="914400" rtl="0" eaLnBrk="1" latinLnBrk="0" hangingPunct="1">
+      <a:defRPr sz="1200" kern="1200">
+        <a:solidFill>
+          <a:schemeClr val="tx1"/>
+        </a:solidFill>
+        <a:latin typeface="+mn-lt"/>
+        <a:ea typeface="+mn-ea"/>
+        <a:cs typeface="+mn-cs"/>
+      </a:defRPr>
+    </a:lvl5pPr>
+    <a:lvl6pPr marL="2286000" algn="l" defTabSz="914400" rtl="0" eaLnBrk="1" latinLnBrk="0" hangingPunct="1">
+      <a:defRPr sz="1200" kern="1200">
+        <a:solidFill>
+          <a:schemeClr val="tx1"/>
+        </a:solidFill>
+        <a:latin typeface="+mn-lt"/>
+        <a:ea typeface="+mn-ea"/>
+        <a:cs typeface="+mn-cs"/>
+      </a:defRPr>
+    </a:lvl6pPr>
+    <a:lvl7pPr marL="2743200" algn="l" defTabSz="914400" rtl="0" eaLnBrk="1" latinLnBrk="0" hangingPunct="1">
+      <a:defRPr sz="1200" kern="1200">
+        <a:solidFill>
+          <a:schemeClr val="tx1"/>
+        </a:solidFill>
+        <a:latin typeface="+mn-lt"/>
+        <a:ea typeface="+mn-ea"/>
+        <a:cs typeface="+mn-cs"/>
+      </a:defRPr>
+    </a:lvl7pPr>
+    <a:lvl8pPr marL="3200400" algn="l" defTabSz="914400" rtl="0" eaLnBrk="1" latinLnBrk="0" hangingPunct="1">
+      <a:defRPr sz="1200" kern="1200">
+        <a:solidFill>
+          <a:schemeClr val="tx1"/>
+        </a:solidFill>
+        <a:latin typeface="+mn-lt"/>
+        <a:ea typeface="+mn-ea"/>
+        <a:cs typeface="+mn-cs"/>
+      </a:defRPr>
+    </a:lvl8pPr>
+    <a:lvl9pPr marL="3657600" algn="l" defTabSz="914400" rtl="0" eaLnBrk="1" latinLnBrk="0" hangingPunct="1">
+      <a:defRPr sz="1200" kern="1200">
+        <a:solidFill>
+          <a:schemeClr val="tx1"/>
+        </a:solidFill>
+        <a:latin typeface="+mn-lt"/>
+        <a:ea typeface="+mn-ea"/>
+        <a:cs typeface="+mn-cs"/>
+      </a:defRPr>
+    </a:lvl9pPr>
+  </p:notesStyle>
+</p:notesMaster>
+</file>
+
+<file path=ppt/notesSlides/notesSlide1.xml><?xml version="1.0" encoding="utf-8"?>
+<p:notes xmlns:a="http://schemas.openxmlformats.org/drawingml/2006/main" xmlns:r="http://schemas.openxmlformats.org/officeDocument/2006/relationships" xmlns:p="http://schemas.openxmlformats.org/presentationml/2006/main">
+  <p:cSld>
+    <p:spTree>
+      <p:nvGrpSpPr>
+        <p:cNvPr id="1" name=""/>
+        <p:cNvGrpSpPr/>
+        <p:nvPr/>
+      </p:nvGrpSpPr>
+      <p:grpSpPr>
+        <a:xfrm>
+          <a:off x="0" y="0"/>
+          <a:ext cx="0" cy="0"/>
+          <a:chOff x="0" y="0"/>
+          <a:chExt cx="0" cy="0"/>
+        </a:xfrm>
+      </p:grpSpPr>
+      <p:sp>
+        <p:nvSpPr>
+          <p:cNvPr id="2" name="Espaço Reservado para Imagem de Slide 1"/>
+          <p:cNvSpPr>
+            <a:spLocks noGrp="1" noRot="1" noChangeAspect="1"/>
+          </p:cNvSpPr>
+          <p:nvPr>
+            <p:ph type="sldImg"/>
+          </p:nvPr>
+        </p:nvSpPr>
+        <p:spPr/>
+      </p:sp>
+      <p:sp>
+        <p:nvSpPr>
+          <p:cNvPr id="3" name="Espaço Reservado para Anotações 2"/>
+          <p:cNvSpPr>
+            <a:spLocks noGrp="1"/>
+          </p:cNvSpPr>
+          <p:nvPr>
+            <p:ph type="body" idx="1"/>
+          </p:nvPr>
+        </p:nvSpPr>
+        <p:spPr/>
+        <p:txBody>
+          <a:bodyPr/>
+          <a:lstStyle/>
+          <a:p>
+            <a:endParaRPr lang="pt-BR" dirty="0"/>
+          </a:p>
+        </p:txBody>
+      </p:sp>
+      <p:sp>
+        <p:nvSpPr>
+          <p:cNvPr id="4" name="Espaço Reservado para Número de Slide 3"/>
+          <p:cNvSpPr>
+            <a:spLocks noGrp="1"/>
+          </p:cNvSpPr>
+          <p:nvPr>
+            <p:ph type="sldNum" sz="quarter" idx="5"/>
+          </p:nvPr>
+        </p:nvSpPr>
+        <p:spPr/>
+        <p:txBody>
+          <a:bodyPr/>
+          <a:lstStyle/>
+          <a:p>
+            <a:fld id="{52881FBC-753B-4899-B442-9DAD17B0F056}" type="slidenum">
+              <a:rPr lang="pt-BR" smtClean="0"/>
+              <a:t>1</a:t>
+            </a:fld>
+            <a:endParaRPr lang="pt-BR"/>
+          </a:p>
+        </p:txBody>
+      </p:sp>
+    </p:spTree>
+    <p:extLst>
+      <p:ext uri="{BB962C8B-B14F-4D97-AF65-F5344CB8AC3E}">
+        <p14:creationId xmlns:p14="http://schemas.microsoft.com/office/powerpoint/2010/main" val="3727278756"/>
+      </p:ext>
+    </p:extLst>
+  </p:cSld>
+  <p:clrMapOvr>
+    <a:masterClrMapping/>
+  </p:clrMapOvr>
+</p:notes>
+</file>
+
 <file path=ppt/slideLayouts/slideLayout1.xml><?xml version="1.0" encoding="utf-8"?>
 <p:sldLayout xmlns:a="http://schemas.openxmlformats.org/drawingml/2006/main" xmlns:r="http://schemas.openxmlformats.org/officeDocument/2006/relationships" xmlns:p="http://schemas.openxmlformats.org/presentationml/2006/main" type="title" preserve="1">
   <p:cSld name="Slide de Título">
@@ -263,7 +709,7 @@
           <a:p>
             <a:fld id="{1FAE8E12-6BC5-4DF0-9F0C-529E65D73EBB}" type="datetimeFigureOut">
               <a:rPr lang="pt-BR" smtClean="0"/>
-              <a:t>17/07/2025</a:t>
+              <a:t>07/08/2025</a:t>
             </a:fld>
             <a:endParaRPr lang="pt-BR"/>
           </a:p>
@@ -461,7 +907,7 @@
           <a:p>
             <a:fld id="{1FAE8E12-6BC5-4DF0-9F0C-529E65D73EBB}" type="datetimeFigureOut">
               <a:rPr lang="pt-BR" smtClean="0"/>
-              <a:t>17/07/2025</a:t>
+              <a:t>07/08/2025</a:t>
             </a:fld>
             <a:endParaRPr lang="pt-BR"/>
           </a:p>
@@ -669,7 +1115,7 @@
           <a:p>
             <a:fld id="{1FAE8E12-6BC5-4DF0-9F0C-529E65D73EBB}" type="datetimeFigureOut">
               <a:rPr lang="pt-BR" smtClean="0"/>
-              <a:t>17/07/2025</a:t>
+              <a:t>07/08/2025</a:t>
             </a:fld>
             <a:endParaRPr lang="pt-BR"/>
           </a:p>
@@ -867,7 +1313,7 @@
           <a:p>
             <a:fld id="{1FAE8E12-6BC5-4DF0-9F0C-529E65D73EBB}" type="datetimeFigureOut">
               <a:rPr lang="pt-BR" smtClean="0"/>
-              <a:t>17/07/2025</a:t>
+              <a:t>07/08/2025</a:t>
             </a:fld>
             <a:endParaRPr lang="pt-BR"/>
           </a:p>
@@ -1142,7 +1588,7 @@
           <a:p>
             <a:fld id="{1FAE8E12-6BC5-4DF0-9F0C-529E65D73EBB}" type="datetimeFigureOut">
               <a:rPr lang="pt-BR" smtClean="0"/>
-              <a:t>17/07/2025</a:t>
+              <a:t>07/08/2025</a:t>
             </a:fld>
             <a:endParaRPr lang="pt-BR"/>
           </a:p>
@@ -1407,7 +1853,7 @@
           <a:p>
             <a:fld id="{1FAE8E12-6BC5-4DF0-9F0C-529E65D73EBB}" type="datetimeFigureOut">
               <a:rPr lang="pt-BR" smtClean="0"/>
-              <a:t>17/07/2025</a:t>
+              <a:t>07/08/2025</a:t>
             </a:fld>
             <a:endParaRPr lang="pt-BR"/>
           </a:p>
@@ -1819,7 +2265,7 @@
           <a:p>
             <a:fld id="{1FAE8E12-6BC5-4DF0-9F0C-529E65D73EBB}" type="datetimeFigureOut">
               <a:rPr lang="pt-BR" smtClean="0"/>
-              <a:t>17/07/2025</a:t>
+              <a:t>07/08/2025</a:t>
             </a:fld>
             <a:endParaRPr lang="pt-BR"/>
           </a:p>
@@ -1960,7 +2406,7 @@
           <a:p>
             <a:fld id="{1FAE8E12-6BC5-4DF0-9F0C-529E65D73EBB}" type="datetimeFigureOut">
               <a:rPr lang="pt-BR" smtClean="0"/>
-              <a:t>17/07/2025</a:t>
+              <a:t>07/08/2025</a:t>
             </a:fld>
             <a:endParaRPr lang="pt-BR"/>
           </a:p>
@@ -2073,7 +2519,7 @@
           <a:p>
             <a:fld id="{1FAE8E12-6BC5-4DF0-9F0C-529E65D73EBB}" type="datetimeFigureOut">
               <a:rPr lang="pt-BR" smtClean="0"/>
-              <a:t>17/07/2025</a:t>
+              <a:t>07/08/2025</a:t>
             </a:fld>
             <a:endParaRPr lang="pt-BR"/>
           </a:p>
@@ -2384,7 +2830,7 @@
           <a:p>
             <a:fld id="{1FAE8E12-6BC5-4DF0-9F0C-529E65D73EBB}" type="datetimeFigureOut">
               <a:rPr lang="pt-BR" smtClean="0"/>
-              <a:t>17/07/2025</a:t>
+              <a:t>07/08/2025</a:t>
             </a:fld>
             <a:endParaRPr lang="pt-BR"/>
           </a:p>
@@ -2672,7 +3118,7 @@
           <a:p>
             <a:fld id="{1FAE8E12-6BC5-4DF0-9F0C-529E65D73EBB}" type="datetimeFigureOut">
               <a:rPr lang="pt-BR" smtClean="0"/>
-              <a:t>17/07/2025</a:t>
+              <a:t>07/08/2025</a:t>
             </a:fld>
             <a:endParaRPr lang="pt-BR"/>
           </a:p>
@@ -2913,7 +3359,7 @@
           <a:p>
             <a:fld id="{1FAE8E12-6BC5-4DF0-9F0C-529E65D73EBB}" type="datetimeFigureOut">
               <a:rPr lang="pt-BR" smtClean="0"/>
-              <a:t>17/07/2025</a:t>
+              <a:t>07/08/2025</a:t>
             </a:fld>
             <a:endParaRPr lang="pt-BR"/>
           </a:p>
@@ -3432,7 +3878,7 @@
           <p:nvPr/>
         </p:nvPicPr>
         <p:blipFill>
-          <a:blip r:embed="rId2">
+          <a:blip r:embed="rId3">
             <a:extLst>
               <a:ext uri="{28A0092B-C50C-407E-A947-70E740481C1C}">
                 <a14:useLocalDpi xmlns:a14="http://schemas.microsoft.com/office/drawing/2010/main" val="0"/>
@@ -3618,7 +4064,7 @@
           <a:noFill/>
         </p:spPr>
         <p:txBody>
-          <a:bodyPr wrap="square" rtlCol="0">
+          <a:bodyPr wrap="square" lIns="91440" tIns="45720" rIns="91440" bIns="45720" rtlCol="0" anchor="t">
             <a:spAutoFit/>
           </a:bodyPr>
           <a:lstStyle/>
@@ -3651,13 +4097,20 @@
             </a:r>
             <a:r>
               <a:rPr lang="en-US" sz="2400" dirty="0"/>
-              <a:t>: A </a:t>
+              <a:t>: </a:t>
             </a:r>
             <a:r>
               <a:rPr lang="en-US" sz="2400" dirty="0" err="1"/>
-              <a:t>marcar</a:t>
-            </a:r>
-            <a:endParaRPr lang="en-US" sz="2400" dirty="0"/>
+              <a:t>Terça</a:t>
+            </a:r>
+            <a:r>
+              <a:rPr lang="en-US" sz="2400" dirty="0"/>
+              <a:t>-Feira 15h30</a:t>
+            </a:r>
+            <a:endParaRPr lang="en-US" sz="2400" dirty="0">
+              <a:ea typeface="Calibri"/>
+              <a:cs typeface="Calibri"/>
+            </a:endParaRPr>
           </a:p>
           <a:p>
             <a:pPr marL="285750" indent="-285750">
@@ -3682,14 +4135,24 @@
               <a:buChar char="Ø"/>
             </a:pPr>
             <a:r>
-              <a:rPr lang="en-US" sz="2400" dirty="0" err="1"/>
+              <a:rPr lang="en-US" sz="2400" err="1"/>
               <a:t>Github</a:t>
             </a:r>
             <a:r>
-              <a:rPr lang="en-US" sz="2400" dirty="0"/>
-              <a:t>: https://github.com/Felipe-Tagawa</a:t>
-            </a:r>
-            <a:endParaRPr lang="pt-BR" sz="2400" dirty="0"/>
+              <a:rPr lang="en-US" sz="2400"/>
+              <a:t>: </a:t>
+            </a:r>
+            <a:r>
+              <a:rPr lang="en-US" sz="2400" dirty="0">
+                <a:ea typeface="+mn-lt"/>
+                <a:cs typeface="+mn-lt"/>
+              </a:rPr>
+              <a:t>https://github.com/Felipe-Tagawa</a:t>
+            </a:r>
+            <a:endParaRPr lang="en-US" sz="2400">
+              <a:ea typeface="+mn-lt"/>
+              <a:cs typeface="+mn-lt"/>
+            </a:endParaRPr>
           </a:p>
         </p:txBody>
       </p:sp>
@@ -4084,6 +4547,370 @@
   <p:cSld>
     <p:spTree>
       <p:nvGrpSpPr>
+        <p:cNvPr id="1" name="">
+          <a:extLst>
+            <a:ext uri="{FF2B5EF4-FFF2-40B4-BE49-F238E27FC236}">
+              <a16:creationId xmlns:a16="http://schemas.microsoft.com/office/drawing/2014/main" id="{5E8A27A6-8EF8-12D8-8FD8-D7F39147A30A}"/>
+            </a:ext>
+          </a:extLst>
+        </p:cNvPr>
+        <p:cNvGrpSpPr/>
+        <p:nvPr/>
+      </p:nvGrpSpPr>
+      <p:grpSpPr>
+        <a:xfrm>
+          <a:off x="0" y="0"/>
+          <a:ext cx="0" cy="0"/>
+          <a:chOff x="0" y="0"/>
+          <a:chExt cx="0" cy="0"/>
+        </a:xfrm>
+      </p:grpSpPr>
+      <p:sp>
+        <p:nvSpPr>
+          <p:cNvPr id="2" name="Título 1">
+            <a:extLst>
+              <a:ext uri="{FF2B5EF4-FFF2-40B4-BE49-F238E27FC236}">
+                <a16:creationId xmlns:a16="http://schemas.microsoft.com/office/drawing/2014/main" id="{6BF18DC9-5815-0212-B6E0-D8C10E6A492B}"/>
+              </a:ext>
+            </a:extLst>
+          </p:cNvPr>
+          <p:cNvSpPr>
+            <a:spLocks noGrp="1"/>
+          </p:cNvSpPr>
+          <p:nvPr>
+            <p:ph type="title"/>
+          </p:nvPr>
+        </p:nvSpPr>
+        <p:spPr/>
+        <p:txBody>
+          <a:bodyPr/>
+          <a:lstStyle/>
+          <a:p>
+            <a:endParaRPr lang="pt-BR"/>
+          </a:p>
+        </p:txBody>
+      </p:sp>
+      <p:sp>
+        <p:nvSpPr>
+          <p:cNvPr id="3" name="Espaço Reservado para Conteúdo 2">
+            <a:extLst>
+              <a:ext uri="{FF2B5EF4-FFF2-40B4-BE49-F238E27FC236}">
+                <a16:creationId xmlns:a16="http://schemas.microsoft.com/office/drawing/2014/main" id="{4A8E3B4E-2F8A-3689-618B-A91B245EFDE0}"/>
+              </a:ext>
+            </a:extLst>
+          </p:cNvPr>
+          <p:cNvSpPr>
+            <a:spLocks noGrp="1"/>
+          </p:cNvSpPr>
+          <p:nvPr>
+            <p:ph idx="1"/>
+          </p:nvPr>
+        </p:nvSpPr>
+        <p:spPr/>
+        <p:txBody>
+          <a:bodyPr/>
+          <a:lstStyle/>
+          <a:p>
+            <a:endParaRPr lang="pt-BR"/>
+          </a:p>
+        </p:txBody>
+      </p:sp>
+      <p:pic>
+        <p:nvPicPr>
+          <p:cNvPr id="4" name="Imagem 3">
+            <a:extLst>
+              <a:ext uri="{FF2B5EF4-FFF2-40B4-BE49-F238E27FC236}">
+                <a16:creationId xmlns:a16="http://schemas.microsoft.com/office/drawing/2014/main" id="{81421DD0-6686-3CBC-6B71-56FD159EB670}"/>
+              </a:ext>
+            </a:extLst>
+          </p:cNvPr>
+          <p:cNvPicPr>
+            <a:picLocks noChangeAspect="1"/>
+          </p:cNvPicPr>
+          <p:nvPr/>
+        </p:nvPicPr>
+        <p:blipFill>
+          <a:blip r:embed="rId2">
+            <a:extLst>
+              <a:ext uri="{28A0092B-C50C-407E-A947-70E740481C1C}">
+                <a14:useLocalDpi xmlns:a14="http://schemas.microsoft.com/office/drawing/2010/main" val="0"/>
+              </a:ext>
+            </a:extLst>
+          </a:blip>
+          <a:stretch>
+            <a:fillRect/>
+          </a:stretch>
+        </p:blipFill>
+        <p:spPr>
+          <a:xfrm>
+            <a:off x="0" y="0"/>
+            <a:ext cx="12192000" cy="6858000"/>
+          </a:xfrm>
+          <a:prstGeom prst="rect">
+            <a:avLst/>
+          </a:prstGeom>
+        </p:spPr>
+      </p:pic>
+      <p:sp>
+        <p:nvSpPr>
+          <p:cNvPr id="5" name="CaixaDeTexto 4">
+            <a:extLst>
+              <a:ext uri="{FF2B5EF4-FFF2-40B4-BE49-F238E27FC236}">
+                <a16:creationId xmlns:a16="http://schemas.microsoft.com/office/drawing/2014/main" id="{37296BF4-EF26-F538-26E9-4DC854B48CD9}"/>
+              </a:ext>
+            </a:extLst>
+          </p:cNvPr>
+          <p:cNvSpPr txBox="1"/>
+          <p:nvPr/>
+        </p:nvSpPr>
+        <p:spPr>
+          <a:xfrm>
+            <a:off x="386861" y="202223"/>
+            <a:ext cx="9064869" cy="2862322"/>
+          </a:xfrm>
+          <a:prstGeom prst="rect">
+            <a:avLst/>
+          </a:prstGeom>
+          <a:noFill/>
+        </p:spPr>
+        <p:txBody>
+          <a:bodyPr wrap="square" rtlCol="0">
+            <a:spAutoFit/>
+          </a:bodyPr>
+          <a:lstStyle/>
+          <a:p>
+            <a:r>
+              <a:rPr lang="en-US" sz="3600" dirty="0" err="1"/>
+              <a:t>Instalação</a:t>
+            </a:r>
+            <a:r>
+              <a:rPr lang="en-US" sz="3600" dirty="0"/>
+              <a:t> do MySQL Workbench</a:t>
+            </a:r>
+          </a:p>
+          <a:p>
+            <a:endParaRPr lang="en-US" sz="3600" dirty="0"/>
+          </a:p>
+          <a:p>
+            <a:pPr marL="285750" indent="-285750">
+              <a:buFont typeface="Wingdings" panose="05000000000000000000" pitchFamily="2" charset="2"/>
+              <a:buChar char="Ø"/>
+            </a:pPr>
+            <a:r>
+              <a:rPr lang="en-US" dirty="0" err="1"/>
+              <a:t>Vídeo</a:t>
+            </a:r>
+            <a:r>
+              <a:rPr lang="en-US" dirty="0"/>
+              <a:t> com </a:t>
+            </a:r>
+            <a:r>
+              <a:rPr lang="en-US" dirty="0" err="1"/>
+              <a:t>os</a:t>
+            </a:r>
+            <a:r>
+              <a:rPr lang="en-US" dirty="0"/>
+              <a:t> </a:t>
+            </a:r>
+            <a:r>
+              <a:rPr lang="en-US" dirty="0" err="1"/>
+              <a:t>detalhes</a:t>
+            </a:r>
+            <a:r>
+              <a:rPr lang="en-US" dirty="0"/>
+              <a:t> da </a:t>
+            </a:r>
+            <a:r>
+              <a:rPr lang="en-US" dirty="0" err="1"/>
+              <a:t>instalação</a:t>
+            </a:r>
+            <a:r>
+              <a:rPr lang="en-US" dirty="0"/>
+              <a:t> no canal do Teams.</a:t>
+            </a:r>
+          </a:p>
+          <a:p>
+            <a:pPr marL="285750" indent="-285750">
+              <a:buFont typeface="Wingdings" panose="05000000000000000000" pitchFamily="2" charset="2"/>
+              <a:buChar char="Ø"/>
+            </a:pPr>
+            <a:r>
+              <a:rPr lang="en-US" dirty="0" err="1"/>
+              <a:t>Arquivo</a:t>
+            </a:r>
+            <a:r>
+              <a:rPr lang="en-US" dirty="0"/>
+              <a:t> com </a:t>
+            </a:r>
+            <a:r>
+              <a:rPr lang="en-US" dirty="0" err="1"/>
+              <a:t>todos</a:t>
+            </a:r>
+            <a:r>
+              <a:rPr lang="en-US" dirty="0"/>
+              <a:t> </a:t>
+            </a:r>
+            <a:r>
+              <a:rPr lang="en-US" dirty="0" err="1"/>
+              <a:t>os</a:t>
+            </a:r>
+            <a:r>
+              <a:rPr lang="en-US" dirty="0"/>
+              <a:t> </a:t>
+            </a:r>
+            <a:r>
+              <a:rPr lang="en-US" dirty="0" err="1"/>
+              <a:t>detalhes</a:t>
+            </a:r>
+            <a:r>
+              <a:rPr lang="en-US" dirty="0"/>
+              <a:t> no TEAMS </a:t>
+            </a:r>
+            <a:r>
+              <a:rPr lang="en-US" dirty="0" err="1"/>
+              <a:t>ou</a:t>
+            </a:r>
+            <a:r>
+              <a:rPr lang="en-US" dirty="0"/>
+              <a:t> no meu </a:t>
+            </a:r>
+            <a:r>
+              <a:rPr lang="en-US" dirty="0" err="1"/>
+              <a:t>repositório</a:t>
+            </a:r>
+            <a:r>
+              <a:rPr lang="en-US" dirty="0"/>
+              <a:t> da </a:t>
+            </a:r>
+            <a:r>
+              <a:rPr lang="en-US" dirty="0" err="1"/>
+              <a:t>disciplina</a:t>
+            </a:r>
+            <a:r>
+              <a:rPr lang="en-US" dirty="0"/>
+              <a:t> no </a:t>
+            </a:r>
+            <a:r>
+              <a:rPr lang="en-US" dirty="0" err="1"/>
+              <a:t>Github</a:t>
+            </a:r>
+            <a:r>
+              <a:rPr lang="en-US" dirty="0"/>
+              <a:t>.</a:t>
+            </a:r>
+          </a:p>
+          <a:p>
+            <a:pPr marL="285750" indent="-285750">
+              <a:buFont typeface="Wingdings" panose="05000000000000000000" pitchFamily="2" charset="2"/>
+              <a:buChar char="Ø"/>
+            </a:pPr>
+            <a:r>
+              <a:rPr lang="en-US" dirty="0"/>
+              <a:t>IMPORTANTE: para </a:t>
+            </a:r>
+            <a:r>
+              <a:rPr lang="en-US" dirty="0" err="1"/>
+              <a:t>facilitar</a:t>
+            </a:r>
+            <a:r>
+              <a:rPr lang="en-US" dirty="0"/>
+              <a:t> entradas posteriores (</a:t>
+            </a:r>
+            <a:r>
+              <a:rPr lang="en-US" dirty="0" err="1"/>
+              <a:t>principalmente</a:t>
+            </a:r>
+            <a:r>
+              <a:rPr lang="en-US" dirty="0"/>
+              <a:t> no </a:t>
+            </a:r>
+            <a:r>
+              <a:rPr lang="en-US" dirty="0" err="1"/>
+              <a:t>projeto</a:t>
+            </a:r>
+            <a:r>
+              <a:rPr lang="en-US" dirty="0"/>
+              <a:t>), </a:t>
+            </a:r>
+            <a:r>
+              <a:rPr lang="en-US" dirty="0" err="1"/>
+              <a:t>recomendo</a:t>
+            </a:r>
+            <a:r>
+              <a:rPr lang="en-US" dirty="0"/>
+              <a:t> </a:t>
+            </a:r>
+            <a:r>
+              <a:rPr lang="en-US" dirty="0" err="1"/>
+              <a:t>colocar</a:t>
+            </a:r>
+            <a:r>
+              <a:rPr lang="en-US" dirty="0"/>
+              <a:t> o </a:t>
+            </a:r>
+            <a:r>
+              <a:rPr lang="en-US" b="1" u="sng" dirty="0" err="1"/>
+              <a:t>nome</a:t>
+            </a:r>
+            <a:r>
+              <a:rPr lang="en-US" b="1" u="sng" dirty="0"/>
+              <a:t> de </a:t>
+            </a:r>
+            <a:r>
+              <a:rPr lang="en-US" b="1" u="sng" dirty="0" err="1"/>
+              <a:t>usuário</a:t>
+            </a:r>
+            <a:r>
+              <a:rPr lang="en-US" b="1" u="sng" dirty="0"/>
+              <a:t> e </a:t>
+            </a:r>
+            <a:r>
+              <a:rPr lang="en-US" b="1" u="sng" dirty="0" err="1"/>
+              <a:t>senha</a:t>
+            </a:r>
+            <a:r>
+              <a:rPr lang="en-US" b="1" u="sng" dirty="0"/>
+              <a:t> </a:t>
+            </a:r>
+            <a:r>
+              <a:rPr lang="en-US" b="1" u="sng" dirty="0" err="1"/>
+              <a:t>como</a:t>
+            </a:r>
+            <a:r>
+              <a:rPr lang="en-US" b="1" u="sng" dirty="0"/>
+              <a:t> “root”</a:t>
+            </a:r>
+            <a:r>
+              <a:rPr lang="en-US" dirty="0"/>
+              <a:t>.</a:t>
+            </a:r>
+          </a:p>
+          <a:p>
+            <a:endParaRPr lang="en-US" dirty="0"/>
+          </a:p>
+          <a:p>
+            <a:endParaRPr lang="pt-BR" dirty="0"/>
+          </a:p>
+        </p:txBody>
+      </p:sp>
+    </p:spTree>
+    <p:extLst>
+      <p:ext uri="{BB962C8B-B14F-4D97-AF65-F5344CB8AC3E}">
+        <p14:creationId xmlns:p14="http://schemas.microsoft.com/office/powerpoint/2010/main" val="3871511497"/>
+      </p:ext>
+    </p:extLst>
+  </p:cSld>
+  <p:clrMapOvr>
+    <a:masterClrMapping/>
+  </p:clrMapOvr>
+</p:sld>
+</file>
+
+<file path=ppt/slides/slide5.xml><?xml version="1.0" encoding="utf-8"?>
+<p:sld xmlns:a="http://schemas.openxmlformats.org/drawingml/2006/main" xmlns:r="http://schemas.openxmlformats.org/officeDocument/2006/relationships" xmlns:p="http://schemas.openxmlformats.org/presentationml/2006/main">
+  <p:cSld>
+    <p:spTree>
+      <p:nvGrpSpPr>
         <p:cNvPr id="1" name=""/>
         <p:cNvGrpSpPr/>
         <p:nvPr/>
@@ -4216,10 +5043,10 @@
       </p:sp>
       <p:pic>
         <p:nvPicPr>
-          <p:cNvPr id="6" name="Imagem 5">
-            <a:extLst>
-              <a:ext uri="{FF2B5EF4-FFF2-40B4-BE49-F238E27FC236}">
-                <a16:creationId xmlns:a16="http://schemas.microsoft.com/office/drawing/2014/main" id="{B1FC49BD-F436-2D8A-6A3B-C8DD95D321E5}"/>
+          <p:cNvPr id="7" name="Imagem 6">
+            <a:extLst>
+              <a:ext uri="{FF2B5EF4-FFF2-40B4-BE49-F238E27FC236}">
+                <a16:creationId xmlns:a16="http://schemas.microsoft.com/office/drawing/2014/main" id="{04B5471A-DAA8-2F18-EC43-4525503A6EAB}"/>
               </a:ext>
             </a:extLst>
           </p:cNvPr>
@@ -4236,8 +5063,8 @@
         </p:blipFill>
         <p:spPr>
           <a:xfrm>
-            <a:off x="2528972" y="1175295"/>
-            <a:ext cx="7134055" cy="4904663"/>
+            <a:off x="2607729" y="1310848"/>
+            <a:ext cx="6976541" cy="4810271"/>
           </a:xfrm>
           <a:prstGeom prst="rect">
             <a:avLst/>
@@ -4257,7 +5084,7 @@
 </p:sld>
 </file>
 
-<file path=ppt/slides/slide5.xml><?xml version="1.0" encoding="utf-8"?>
+<file path=ppt/slides/slide6.xml><?xml version="1.0" encoding="utf-8"?>
 <p:sld xmlns:a="http://schemas.openxmlformats.org/drawingml/2006/main" xmlns:r="http://schemas.openxmlformats.org/officeDocument/2006/relationships" xmlns:p="http://schemas.openxmlformats.org/presentationml/2006/main">
   <p:cSld>
     <p:spTree>
@@ -4517,7 +5344,7 @@
           </a:fontRef>
         </p:style>
         <p:txBody>
-          <a:bodyPr wrap="square" rtlCol="0">
+          <a:bodyPr wrap="square" lIns="91440" tIns="45720" rIns="91440" bIns="45720" rtlCol="0" anchor="t">
             <a:spAutoFit/>
           </a:bodyPr>
           <a:lstStyle/>
@@ -4526,7 +5353,10 @@
               <a:rPr lang="en-US" dirty="0"/>
               <a:t>NEP = (EP1 + EP2)</a:t>
             </a:r>
-            <a:endParaRPr lang="pt-BR" dirty="0"/>
+            <a:endParaRPr lang="en-US" dirty="0">
+              <a:ea typeface="Calibri"/>
+              <a:cs typeface="Calibri"/>
+            </a:endParaRPr>
           </a:p>
         </p:txBody>
       </p:sp>
@@ -4668,6 +5498,177 @@
     <p:extLst>
       <p:ext uri="{BB962C8B-B14F-4D97-AF65-F5344CB8AC3E}">
         <p14:creationId xmlns:p14="http://schemas.microsoft.com/office/powerpoint/2010/main" val="100472821"/>
+      </p:ext>
+    </p:extLst>
+  </p:cSld>
+  <p:clrMapOvr>
+    <a:masterClrMapping/>
+  </p:clrMapOvr>
+</p:sld>
+</file>
+
+<file path=ppt/slides/slide7.xml><?xml version="1.0" encoding="utf-8"?>
+<p:sld xmlns:a="http://schemas.openxmlformats.org/drawingml/2006/main" xmlns:r="http://schemas.openxmlformats.org/officeDocument/2006/relationships" xmlns:p="http://schemas.openxmlformats.org/presentationml/2006/main">
+  <p:cSld>
+    <p:spTree>
+      <p:nvGrpSpPr>
+        <p:cNvPr id="1" name="">
+          <a:extLst>
+            <a:ext uri="{FF2B5EF4-FFF2-40B4-BE49-F238E27FC236}">
+              <a16:creationId xmlns:a16="http://schemas.microsoft.com/office/drawing/2014/main" id="{A9F73D6E-FC32-50DA-1CBC-9FDC465B155C}"/>
+            </a:ext>
+          </a:extLst>
+        </p:cNvPr>
+        <p:cNvGrpSpPr/>
+        <p:nvPr/>
+      </p:nvGrpSpPr>
+      <p:grpSpPr>
+        <a:xfrm>
+          <a:off x="0" y="0"/>
+          <a:ext cx="0" cy="0"/>
+          <a:chOff x="0" y="0"/>
+          <a:chExt cx="0" cy="0"/>
+        </a:xfrm>
+      </p:grpSpPr>
+      <p:sp>
+        <p:nvSpPr>
+          <p:cNvPr id="2" name="Título 1">
+            <a:extLst>
+              <a:ext uri="{FF2B5EF4-FFF2-40B4-BE49-F238E27FC236}">
+                <a16:creationId xmlns:a16="http://schemas.microsoft.com/office/drawing/2014/main" id="{7D33F163-C736-9349-5711-22D353FEFD1A}"/>
+              </a:ext>
+            </a:extLst>
+          </p:cNvPr>
+          <p:cNvSpPr>
+            <a:spLocks noGrp="1"/>
+          </p:cNvSpPr>
+          <p:nvPr>
+            <p:ph type="title"/>
+          </p:nvPr>
+        </p:nvSpPr>
+        <p:spPr/>
+        <p:txBody>
+          <a:bodyPr/>
+          <a:lstStyle/>
+          <a:p>
+            <a:endParaRPr lang="pt-BR"/>
+          </a:p>
+        </p:txBody>
+      </p:sp>
+      <p:sp>
+        <p:nvSpPr>
+          <p:cNvPr id="3" name="Espaço Reservado para Conteúdo 2">
+            <a:extLst>
+              <a:ext uri="{FF2B5EF4-FFF2-40B4-BE49-F238E27FC236}">
+                <a16:creationId xmlns:a16="http://schemas.microsoft.com/office/drawing/2014/main" id="{13625611-E7FA-1D72-494A-0AFBC3CF9FB2}"/>
+              </a:ext>
+            </a:extLst>
+          </p:cNvPr>
+          <p:cNvSpPr>
+            <a:spLocks noGrp="1"/>
+          </p:cNvSpPr>
+          <p:nvPr>
+            <p:ph idx="1"/>
+          </p:nvPr>
+        </p:nvSpPr>
+        <p:spPr/>
+        <p:txBody>
+          <a:bodyPr/>
+          <a:lstStyle/>
+          <a:p>
+            <a:endParaRPr lang="pt-BR"/>
+          </a:p>
+        </p:txBody>
+      </p:sp>
+      <p:pic>
+        <p:nvPicPr>
+          <p:cNvPr id="4" name="Imagem 3">
+            <a:extLst>
+              <a:ext uri="{FF2B5EF4-FFF2-40B4-BE49-F238E27FC236}">
+                <a16:creationId xmlns:a16="http://schemas.microsoft.com/office/drawing/2014/main" id="{743371B3-3339-12F0-DD89-453EBF0A0ED8}"/>
+              </a:ext>
+            </a:extLst>
+          </p:cNvPr>
+          <p:cNvPicPr>
+            <a:picLocks noChangeAspect="1"/>
+          </p:cNvPicPr>
+          <p:nvPr/>
+        </p:nvPicPr>
+        <p:blipFill>
+          <a:blip r:embed="rId2">
+            <a:extLst>
+              <a:ext uri="{28A0092B-C50C-407E-A947-70E740481C1C}">
+                <a14:useLocalDpi xmlns:a14="http://schemas.microsoft.com/office/drawing/2010/main" val="0"/>
+              </a:ext>
+            </a:extLst>
+          </a:blip>
+          <a:stretch>
+            <a:fillRect/>
+          </a:stretch>
+        </p:blipFill>
+        <p:spPr>
+          <a:xfrm>
+            <a:off x="0" y="0"/>
+            <a:ext cx="12192000" cy="6858000"/>
+          </a:xfrm>
+          <a:prstGeom prst="rect">
+            <a:avLst/>
+          </a:prstGeom>
+        </p:spPr>
+      </p:pic>
+      <p:sp>
+        <p:nvSpPr>
+          <p:cNvPr id="5" name="CaixaDeTexto 4">
+            <a:extLst>
+              <a:ext uri="{FF2B5EF4-FFF2-40B4-BE49-F238E27FC236}">
+                <a16:creationId xmlns:a16="http://schemas.microsoft.com/office/drawing/2014/main" id="{C30338DA-9061-D8D4-B5A5-66A14A047FD4}"/>
+              </a:ext>
+            </a:extLst>
+          </p:cNvPr>
+          <p:cNvSpPr txBox="1"/>
+          <p:nvPr/>
+        </p:nvSpPr>
+        <p:spPr>
+          <a:xfrm>
+            <a:off x="3924300" y="2413337"/>
+            <a:ext cx="4343400" cy="1938992"/>
+          </a:xfrm>
+          <a:prstGeom prst="rect">
+            <a:avLst/>
+          </a:prstGeom>
+          <a:noFill/>
+        </p:spPr>
+        <p:txBody>
+          <a:bodyPr wrap="square" rtlCol="0">
+            <a:spAutoFit/>
+          </a:bodyPr>
+          <a:lstStyle/>
+          <a:p>
+            <a:pPr algn="ctr"/>
+            <a:r>
+              <a:rPr lang="en-US" sz="6000" dirty="0">
+                <a:solidFill>
+                  <a:schemeClr val="accent5">
+                    <a:lumMod val="75000"/>
+                  </a:schemeClr>
+                </a:solidFill>
+              </a:rPr>
+              <a:t>AULA CONCLUÍDA!</a:t>
+            </a:r>
+            <a:endParaRPr lang="pt-BR" sz="6000" dirty="0">
+              <a:solidFill>
+                <a:schemeClr val="accent5">
+                  <a:lumMod val="75000"/>
+                </a:schemeClr>
+              </a:solidFill>
+            </a:endParaRPr>
+          </a:p>
+        </p:txBody>
+      </p:sp>
+    </p:spTree>
+    <p:extLst>
+      <p:ext uri="{BB962C8B-B14F-4D97-AF65-F5344CB8AC3E}">
+        <p14:creationId xmlns:p14="http://schemas.microsoft.com/office/powerpoint/2010/main" val="3532846639"/>
       </p:ext>
     </p:extLst>
   </p:cSld>
@@ -4970,4 +5971,546 @@
     </a:ext>
   </a:extLst>
 </a:theme>
+</file>
+
+<file path=ppt/theme/theme2.xml><?xml version="1.0" encoding="utf-8"?>
+<a:theme xmlns:a="http://schemas.openxmlformats.org/drawingml/2006/main" name="Tema do Office">
+  <a:themeElements>
+    <a:clrScheme name="Office">
+      <a:dk1>
+        <a:sysClr val="windowText" lastClr="000000"/>
+      </a:dk1>
+      <a:lt1>
+        <a:sysClr val="window" lastClr="FFFFFF"/>
+      </a:lt1>
+      <a:dk2>
+        <a:srgbClr val="44546A"/>
+      </a:dk2>
+      <a:lt2>
+        <a:srgbClr val="E7E6E6"/>
+      </a:lt2>
+      <a:accent1>
+        <a:srgbClr val="4472C4"/>
+      </a:accent1>
+      <a:accent2>
+        <a:srgbClr val="ED7D31"/>
+      </a:accent2>
+      <a:accent3>
+        <a:srgbClr val="A5A5A5"/>
+      </a:accent3>
+      <a:accent4>
+        <a:srgbClr val="FFC000"/>
+      </a:accent4>
+      <a:accent5>
+        <a:srgbClr val="5B9BD5"/>
+      </a:accent5>
+      <a:accent6>
+        <a:srgbClr val="70AD47"/>
+      </a:accent6>
+      <a:hlink>
+        <a:srgbClr val="0563C1"/>
+      </a:hlink>
+      <a:folHlink>
+        <a:srgbClr val="954F72"/>
+      </a:folHlink>
+    </a:clrScheme>
+    <a:fontScheme name="Office">
+      <a:majorFont>
+        <a:latin typeface="Calibri Light" panose="020F0302020204030204"/>
+        <a:ea typeface=""/>
+        <a:cs typeface=""/>
+        <a:font script="Jpan" typeface="游ゴシック Light"/>
+        <a:font script="Hang" typeface="맑은 고딕"/>
+        <a:font script="Hans" typeface="等线 Light"/>
+        <a:font script="Hant" typeface="新細明體"/>
+        <a:font script="Arab" typeface="Times New Roman"/>
+        <a:font script="Hebr" typeface="Times New Roman"/>
+        <a:font script="Thai" typeface="Angsana New"/>
+        <a:font script="Ethi" typeface="Nyala"/>
+        <a:font script="Beng" typeface="Vrinda"/>
+        <a:font script="Gujr" typeface="Shruti"/>
+        <a:font script="Khmr" typeface="MoolBoran"/>
+        <a:font script="Knda" typeface="Tunga"/>
+        <a:font script="Guru" typeface="Raavi"/>
+        <a:font script="Cans" typeface="Euphemia"/>
+        <a:font script="Cher" typeface="Plantagenet Cherokee"/>
+        <a:font script="Yiii" typeface="Microsoft Yi Baiti"/>
+        <a:font script="Tibt" typeface="Microsoft Himalaya"/>
+        <a:font script="Thaa" typeface="MV Boli"/>
+        <a:font script="Deva" typeface="Mangal"/>
+        <a:font script="Telu" typeface="Gautami"/>
+        <a:font script="Taml" typeface="Latha"/>
+        <a:font script="Syrc" typeface="Estrangelo Edessa"/>
+        <a:font script="Orya" typeface="Kalinga"/>
+        <a:font script="Mlym" typeface="Kartika"/>
+        <a:font script="Laoo" typeface="DokChampa"/>
+        <a:font script="Sinh" typeface="Iskoola Pota"/>
+        <a:font script="Mong" typeface="Mongolian Baiti"/>
+        <a:font script="Viet" typeface="Times New Roman"/>
+        <a:font script="Uigh" typeface="Microsoft Uighur"/>
+        <a:font script="Geor" typeface="Sylfaen"/>
+        <a:font script="Armn" typeface="Arial"/>
+        <a:font script="Bugi" typeface="Leelawadee UI"/>
+        <a:font script="Bopo" typeface="Microsoft JhengHei"/>
+        <a:font script="Java" typeface="Javanese Text"/>
+        <a:font script="Lisu" typeface="Segoe UI"/>
+        <a:font script="Mymr" typeface="Myanmar Text"/>
+        <a:font script="Nkoo" typeface="Ebrima"/>
+        <a:font script="Olck" typeface="Nirmala UI"/>
+        <a:font script="Osma" typeface="Ebrima"/>
+        <a:font script="Phag" typeface="Phagspa"/>
+        <a:font script="Syrn" typeface="Estrangelo Edessa"/>
+        <a:font script="Syrj" typeface="Estrangelo Edessa"/>
+        <a:font script="Syre" typeface="Estrangelo Edessa"/>
+        <a:font script="Sora" typeface="Nirmala UI"/>
+        <a:font script="Tale" typeface="Microsoft Tai Le"/>
+        <a:font script="Talu" typeface="Microsoft New Tai Lue"/>
+        <a:font script="Tfng" typeface="Ebrima"/>
+      </a:majorFont>
+      <a:minorFont>
+        <a:latin typeface="Calibri" panose="020F0502020204030204"/>
+        <a:ea typeface=""/>
+        <a:cs typeface=""/>
+        <a:font script="Jpan" typeface="游ゴシック"/>
+        <a:font script="Hang" typeface="맑은 고딕"/>
+        <a:font script="Hans" typeface="等线"/>
+        <a:font script="Hant" typeface="新細明體"/>
+        <a:font script="Arab" typeface="Arial"/>
+        <a:font script="Hebr" typeface="Arial"/>
+        <a:font script="Thai" typeface="Cordia New"/>
+        <a:font script="Ethi" typeface="Nyala"/>
+        <a:font script="Beng" typeface="Vrinda"/>
+        <a:font script="Gujr" typeface="Shruti"/>
+        <a:font script="Khmr" typeface="DaunPenh"/>
+        <a:font script="Knda" typeface="Tunga"/>
+        <a:font script="Guru" typeface="Raavi"/>
+        <a:font script="Cans" typeface="Euphemia"/>
+        <a:font script="Cher" typeface="Plantagenet Cherokee"/>
+        <a:font script="Yiii" typeface="Microsoft Yi Baiti"/>
+        <a:font script="Tibt" typeface="Microsoft Himalaya"/>
+        <a:font script="Thaa" typeface="MV Boli"/>
+        <a:font script="Deva" typeface="Mangal"/>
+        <a:font script="Telu" typeface="Gautami"/>
+        <a:font script="Taml" typeface="Latha"/>
+        <a:font script="Syrc" typeface="Estrangelo Edessa"/>
+        <a:font script="Orya" typeface="Kalinga"/>
+        <a:font script="Mlym" typeface="Kartika"/>
+        <a:font script="Laoo" typeface="DokChampa"/>
+        <a:font script="Sinh" typeface="Iskoola Pota"/>
+        <a:font script="Mong" typeface="Mongolian Baiti"/>
+        <a:font script="Viet" typeface="Arial"/>
+        <a:font script="Uigh" typeface="Microsoft Uighur"/>
+        <a:font script="Geor" typeface="Sylfaen"/>
+        <a:font script="Armn" typeface="Arial"/>
+        <a:font script="Bugi" typeface="Leelawadee UI"/>
+        <a:font script="Bopo" typeface="Microsoft JhengHei"/>
+        <a:font script="Java" typeface="Javanese Text"/>
+        <a:font script="Lisu" typeface="Segoe UI"/>
+        <a:font script="Mymr" typeface="Myanmar Text"/>
+        <a:font script="Nkoo" typeface="Ebrima"/>
+        <a:font script="Olck" typeface="Nirmala UI"/>
+        <a:font script="Osma" typeface="Ebrima"/>
+        <a:font script="Phag" typeface="Phagspa"/>
+        <a:font script="Syrn" typeface="Estrangelo Edessa"/>
+        <a:font script="Syrj" typeface="Estrangelo Edessa"/>
+        <a:font script="Syre" typeface="Estrangelo Edessa"/>
+        <a:font script="Sora" typeface="Nirmala UI"/>
+        <a:font script="Tale" typeface="Microsoft Tai Le"/>
+        <a:font script="Talu" typeface="Microsoft New Tai Lue"/>
+        <a:font script="Tfng" typeface="Ebrima"/>
+      </a:minorFont>
+    </a:fontScheme>
+    <a:fmtScheme name="Office">
+      <a:fillStyleLst>
+        <a:solidFill>
+          <a:schemeClr val="phClr"/>
+        </a:solidFill>
+        <a:gradFill rotWithShape="1">
+          <a:gsLst>
+            <a:gs pos="0">
+              <a:schemeClr val="phClr">
+                <a:lumMod val="110000"/>
+                <a:satMod val="105000"/>
+                <a:tint val="67000"/>
+              </a:schemeClr>
+            </a:gs>
+            <a:gs pos="50000">
+              <a:schemeClr val="phClr">
+                <a:lumMod val="105000"/>
+                <a:satMod val="103000"/>
+                <a:tint val="73000"/>
+              </a:schemeClr>
+            </a:gs>
+            <a:gs pos="100000">
+              <a:schemeClr val="phClr">
+                <a:lumMod val="105000"/>
+                <a:satMod val="109000"/>
+                <a:tint val="81000"/>
+              </a:schemeClr>
+            </a:gs>
+          </a:gsLst>
+          <a:lin ang="5400000" scaled="0"/>
+        </a:gradFill>
+        <a:gradFill rotWithShape="1">
+          <a:gsLst>
+            <a:gs pos="0">
+              <a:schemeClr val="phClr">
+                <a:satMod val="103000"/>
+                <a:lumMod val="102000"/>
+                <a:tint val="94000"/>
+              </a:schemeClr>
+            </a:gs>
+            <a:gs pos="50000">
+              <a:schemeClr val="phClr">
+                <a:satMod val="110000"/>
+                <a:lumMod val="100000"/>
+                <a:shade val="100000"/>
+              </a:schemeClr>
+            </a:gs>
+            <a:gs pos="100000">
+              <a:schemeClr val="phClr">
+                <a:lumMod val="99000"/>
+                <a:satMod val="120000"/>
+                <a:shade val="78000"/>
+              </a:schemeClr>
+            </a:gs>
+          </a:gsLst>
+          <a:lin ang="5400000" scaled="0"/>
+        </a:gradFill>
+      </a:fillStyleLst>
+      <a:lnStyleLst>
+        <a:ln w="6350" cap="flat" cmpd="sng" algn="ctr">
+          <a:solidFill>
+            <a:schemeClr val="phClr"/>
+          </a:solidFill>
+          <a:prstDash val="solid"/>
+          <a:miter lim="800000"/>
+        </a:ln>
+        <a:ln w="12700" cap="flat" cmpd="sng" algn="ctr">
+          <a:solidFill>
+            <a:schemeClr val="phClr"/>
+          </a:solidFill>
+          <a:prstDash val="solid"/>
+          <a:miter lim="800000"/>
+        </a:ln>
+        <a:ln w="19050" cap="flat" cmpd="sng" algn="ctr">
+          <a:solidFill>
+            <a:schemeClr val="phClr"/>
+          </a:solidFill>
+          <a:prstDash val="solid"/>
+          <a:miter lim="800000"/>
+        </a:ln>
+      </a:lnStyleLst>
+      <a:effectStyleLst>
+        <a:effectStyle>
+          <a:effectLst/>
+        </a:effectStyle>
+        <a:effectStyle>
+          <a:effectLst/>
+        </a:effectStyle>
+        <a:effectStyle>
+          <a:effectLst>
+            <a:outerShdw blurRad="57150" dist="19050" dir="5400000" algn="ctr" rotWithShape="0">
+              <a:srgbClr val="000000">
+                <a:alpha val="63000"/>
+              </a:srgbClr>
+            </a:outerShdw>
+          </a:effectLst>
+        </a:effectStyle>
+      </a:effectStyleLst>
+      <a:bgFillStyleLst>
+        <a:solidFill>
+          <a:schemeClr val="phClr"/>
+        </a:solidFill>
+        <a:solidFill>
+          <a:schemeClr val="phClr">
+            <a:tint val="95000"/>
+            <a:satMod val="170000"/>
+          </a:schemeClr>
+        </a:solidFill>
+        <a:gradFill rotWithShape="1">
+          <a:gsLst>
+            <a:gs pos="0">
+              <a:schemeClr val="phClr">
+                <a:tint val="93000"/>
+                <a:satMod val="150000"/>
+                <a:shade val="98000"/>
+                <a:lumMod val="102000"/>
+              </a:schemeClr>
+            </a:gs>
+            <a:gs pos="50000">
+              <a:schemeClr val="phClr">
+                <a:tint val="98000"/>
+                <a:satMod val="130000"/>
+                <a:shade val="90000"/>
+                <a:lumMod val="103000"/>
+              </a:schemeClr>
+            </a:gs>
+            <a:gs pos="100000">
+              <a:schemeClr val="phClr">
+                <a:shade val="63000"/>
+                <a:satMod val="120000"/>
+              </a:schemeClr>
+            </a:gs>
+          </a:gsLst>
+          <a:lin ang="5400000" scaled="0"/>
+        </a:gradFill>
+      </a:bgFillStyleLst>
+    </a:fmtScheme>
+  </a:themeElements>
+  <a:objectDefaults/>
+  <a:extraClrSchemeLst/>
+  <a:extLst>
+    <a:ext uri="{05A4C25C-085E-4340-85A3-A5531E510DB2}">
+      <thm15:themeFamily xmlns:thm15="http://schemas.microsoft.com/office/thememl/2012/main" name="Office Theme" id="{62F939B6-93AF-4DB8-9C6B-D6C7DFDC589F}" vid="{4A3C46E8-61CC-4603-A589-7422A47A8E4A}"/>
+    </a:ext>
+  </a:extLst>
+</a:theme>
+</file>
+
+<file path=customXml/item1.xml><?xml version="1.0" encoding="utf-8"?>
+<ct:contentTypeSchema xmlns:ct="http://schemas.microsoft.com/office/2006/metadata/contentType" xmlns:ma="http://schemas.microsoft.com/office/2006/metadata/properties/metaAttributes" ct:_="" ma:_="" ma:contentTypeName="Document" ma:contentTypeID="0x01010063712E170922C849903EEEDCF4FADC11" ma:contentTypeVersion="10" ma:contentTypeDescription="Create a new document." ma:contentTypeScope="" ma:versionID="9ca76f3d6fd902564539b0a341b08038">
+  <xsd:schema xmlns:xsd="http://www.w3.org/2001/XMLSchema" xmlns:xs="http://www.w3.org/2001/XMLSchema" xmlns:p="http://schemas.microsoft.com/office/2006/metadata/properties" xmlns:ns2="6f1de3ac-cc62-46a8-878b-50c2cb27ddd5" xmlns:ns3="9ae1974e-224e-4f33-b654-b9069661b295" targetNamespace="http://schemas.microsoft.com/office/2006/metadata/properties" ma:root="true" ma:fieldsID="3b1c48a9e619a27b5cd698fb7d458a10" ns2:_="" ns3:_="">
+    <xsd:import namespace="6f1de3ac-cc62-46a8-878b-50c2cb27ddd5"/>
+    <xsd:import namespace="9ae1974e-224e-4f33-b654-b9069661b295"/>
+    <xsd:element name="properties">
+      <xsd:complexType>
+        <xsd:sequence>
+          <xsd:element name="documentManagement">
+            <xsd:complexType>
+              <xsd:all>
+                <xsd:element ref="ns2:MediaServiceMetadata" minOccurs="0"/>
+                <xsd:element ref="ns2:MediaServiceFastMetadata" minOccurs="0"/>
+                <xsd:element ref="ns2:MediaServiceSearchProperties" minOccurs="0"/>
+                <xsd:element ref="ns2:MediaServiceDateTaken" minOccurs="0"/>
+                <xsd:element ref="ns2:lcf76f155ced4ddcb4097134ff3c332f" minOccurs="0"/>
+                <xsd:element ref="ns3:TaxCatchAll" minOccurs="0"/>
+                <xsd:element ref="ns2:MediaServiceOCR" minOccurs="0"/>
+                <xsd:element ref="ns2:MediaServiceGenerationTime" minOccurs="0"/>
+                <xsd:element ref="ns2:MediaServiceEventHashCode" minOccurs="0"/>
+              </xsd:all>
+            </xsd:complexType>
+          </xsd:element>
+        </xsd:sequence>
+      </xsd:complexType>
+    </xsd:element>
+  </xsd:schema>
+  <xsd:schema xmlns:xsd="http://www.w3.org/2001/XMLSchema" xmlns:xs="http://www.w3.org/2001/XMLSchema" xmlns:dms="http://schemas.microsoft.com/office/2006/documentManagement/types" xmlns:pc="http://schemas.microsoft.com/office/infopath/2007/PartnerControls" targetNamespace="6f1de3ac-cc62-46a8-878b-50c2cb27ddd5" elementFormDefault="qualified">
+    <xsd:import namespace="http://schemas.microsoft.com/office/2006/documentManagement/types"/>
+    <xsd:import namespace="http://schemas.microsoft.com/office/infopath/2007/PartnerControls"/>
+    <xsd:element name="MediaServiceMetadata" ma:index="8" nillable="true" ma:displayName="MediaServiceMetadata" ma:hidden="true" ma:internalName="MediaServiceMetadata" ma:readOnly="true">
+      <xsd:simpleType>
+        <xsd:restriction base="dms:Note"/>
+      </xsd:simpleType>
+    </xsd:element>
+    <xsd:element name="MediaServiceFastMetadata" ma:index="9" nillable="true" ma:displayName="MediaServiceFastMetadata" ma:hidden="true" ma:internalName="MediaServiceFastMetadata" ma:readOnly="true">
+      <xsd:simpleType>
+        <xsd:restriction base="dms:Note"/>
+      </xsd:simpleType>
+    </xsd:element>
+    <xsd:element name="MediaServiceSearchProperties" ma:index="10" nillable="true" ma:displayName="MediaServiceSearchProperties" ma:hidden="true" ma:internalName="MediaServiceSearchProperties" ma:readOnly="true">
+      <xsd:simpleType>
+        <xsd:restriction base="dms:Note"/>
+      </xsd:simpleType>
+    </xsd:element>
+    <xsd:element name="MediaServiceDateTaken" ma:index="11" nillable="true" ma:displayName="MediaServiceDateTaken" ma:hidden="true" ma:indexed="true" ma:internalName="MediaServiceDateTaken" ma:readOnly="true">
+      <xsd:simpleType>
+        <xsd:restriction base="dms:Text"/>
+      </xsd:simpleType>
+    </xsd:element>
+    <xsd:element name="lcf76f155ced4ddcb4097134ff3c332f" ma:index="13" nillable="true" ma:taxonomy="true" ma:internalName="lcf76f155ced4ddcb4097134ff3c332f" ma:taxonomyFieldName="MediaServiceImageTags" ma:displayName="Image Tags" ma:readOnly="false" ma:fieldId="{5cf76f15-5ced-4ddc-b409-7134ff3c332f}" ma:taxonomyMulti="true" ma:sspId="d1d24b6d-5369-40ba-942b-984191426f20" ma:termSetId="09814cd3-568e-fe90-9814-8d621ff8fb84" ma:anchorId="fba54fb3-c3e1-fe81-a776-ca4b69148c4d" ma:open="true" ma:isKeyword="false">
+      <xsd:complexType>
+        <xsd:sequence>
+          <xsd:element ref="pc:Terms" minOccurs="0" maxOccurs="1"/>
+        </xsd:sequence>
+      </xsd:complexType>
+    </xsd:element>
+    <xsd:element name="MediaServiceOCR" ma:index="15" nillable="true" ma:displayName="Extracted Text" ma:internalName="MediaServiceOCR" ma:readOnly="true">
+      <xsd:simpleType>
+        <xsd:restriction base="dms:Note">
+          <xsd:maxLength value="255"/>
+        </xsd:restriction>
+      </xsd:simpleType>
+    </xsd:element>
+    <xsd:element name="MediaServiceGenerationTime" ma:index="16" nillable="true" ma:displayName="MediaServiceGenerationTime" ma:hidden="true" ma:internalName="MediaServiceGenerationTime" ma:readOnly="true">
+      <xsd:simpleType>
+        <xsd:restriction base="dms:Text"/>
+      </xsd:simpleType>
+    </xsd:element>
+    <xsd:element name="MediaServiceEventHashCode" ma:index="17" nillable="true" ma:displayName="MediaServiceEventHashCode" ma:hidden="true" ma:internalName="MediaServiceEventHashCode" ma:readOnly="true">
+      <xsd:simpleType>
+        <xsd:restriction base="dms:Text"/>
+      </xsd:simpleType>
+    </xsd:element>
+  </xsd:schema>
+  <xsd:schema xmlns:xsd="http://www.w3.org/2001/XMLSchema" xmlns:xs="http://www.w3.org/2001/XMLSchema" xmlns:dms="http://schemas.microsoft.com/office/2006/documentManagement/types" xmlns:pc="http://schemas.microsoft.com/office/infopath/2007/PartnerControls" targetNamespace="9ae1974e-224e-4f33-b654-b9069661b295" elementFormDefault="qualified">
+    <xsd:import namespace="http://schemas.microsoft.com/office/2006/documentManagement/types"/>
+    <xsd:import namespace="http://schemas.microsoft.com/office/infopath/2007/PartnerControls"/>
+    <xsd:element name="TaxCatchAll" ma:index="14" nillable="true" ma:displayName="Taxonomy Catch All Column" ma:hidden="true" ma:list="{f0968a81-91c8-48d1-97ff-c657311b1151}" ma:internalName="TaxCatchAll" ma:showField="CatchAllData" ma:web="9ae1974e-224e-4f33-b654-b9069661b295">
+      <xsd:complexType>
+        <xsd:complexContent>
+          <xsd:extension base="dms:MultiChoiceLookup">
+            <xsd:sequence>
+              <xsd:element name="Value" type="dms:Lookup" maxOccurs="unbounded" minOccurs="0" nillable="true"/>
+            </xsd:sequence>
+          </xsd:extension>
+        </xsd:complexContent>
+      </xsd:complexType>
+    </xsd:element>
+  </xsd:schema>
+  <xsd:schema xmlns="http://schemas.openxmlformats.org/package/2006/metadata/core-properties" xmlns:xsd="http://www.w3.org/2001/XMLSchema" xmlns:xsi="http://www.w3.org/2001/XMLSchema-instance" xmlns:dc="http://purl.org/dc/elements/1.1/" xmlns:dcterms="http://purl.org/dc/terms/" xmlns:odoc="http://schemas.microsoft.com/internal/obd" targetNamespace="http://schemas.openxmlformats.org/package/2006/metadata/core-properties" elementFormDefault="qualified" attributeFormDefault="unqualified" blockDefault="#all">
+    <xsd:import namespace="http://purl.org/dc/elements/1.1/" schemaLocation="http://dublincore.org/schemas/xmls/qdc/2003/04/02/dc.xsd"/>
+    <xsd:import namespace="http://purl.org/dc/terms/" schemaLocation="http://dublincore.org/schemas/xmls/qdc/2003/04/02/dcterms.xsd"/>
+    <xsd:element name="coreProperties" type="CT_coreProperties"/>
+    <xsd:complexType name="CT_coreProperties">
+      <xsd:all>
+        <xsd:element ref="dc:creator" minOccurs="0" maxOccurs="1"/>
+        <xsd:element ref="dcterms:created" minOccurs="0" maxOccurs="1"/>
+        <xsd:element ref="dc:identifier" minOccurs="0" maxOccurs="1"/>
+        <xsd:element name="contentType" minOccurs="0" maxOccurs="1" type="xsd:string" ma:index="0" ma:displayName="Content Type"/>
+        <xsd:element ref="dc:title" minOccurs="0" maxOccurs="1" ma:index="4" ma:displayName="Title"/>
+        <xsd:element ref="dc:subject" minOccurs="0" maxOccurs="1"/>
+        <xsd:element ref="dc:description" minOccurs="0" maxOccurs="1"/>
+        <xsd:element name="keywords" minOccurs="0" maxOccurs="1" type="xsd:string"/>
+        <xsd:element ref="dc:language" minOccurs="0" maxOccurs="1"/>
+        <xsd:element name="category" minOccurs="0" maxOccurs="1" type="xsd:string"/>
+        <xsd:element name="version" minOccurs="0" maxOccurs="1" type="xsd:string"/>
+        <xsd:element name="revision" minOccurs="0" maxOccurs="1" type="xsd:string">
+          <xsd:annotation>
+            <xsd:documentation>
+                        This value indicates the number of saves or revisions. The application is responsible for updating this value after each revision.
+                    </xsd:documentation>
+          </xsd:annotation>
+        </xsd:element>
+        <xsd:element name="lastModifiedBy" minOccurs="0" maxOccurs="1" type="xsd:string"/>
+        <xsd:element ref="dcterms:modified" minOccurs="0" maxOccurs="1"/>
+        <xsd:element name="contentStatus" minOccurs="0" maxOccurs="1" type="xsd:string"/>
+      </xsd:all>
+    </xsd:complexType>
+  </xsd:schema>
+  <xs:schema xmlns:pc="http://schemas.microsoft.com/office/infopath/2007/PartnerControls" xmlns:xs="http://www.w3.org/2001/XMLSchema" targetNamespace="http://schemas.microsoft.com/office/infopath/2007/PartnerControls" elementFormDefault="qualified" attributeFormDefault="unqualified">
+    <xs:element name="Person">
+      <xs:complexType>
+        <xs:sequence>
+          <xs:element ref="pc:DisplayName" minOccurs="0"/>
+          <xs:element ref="pc:AccountId" minOccurs="0"/>
+          <xs:element ref="pc:AccountType" minOccurs="0"/>
+        </xs:sequence>
+      </xs:complexType>
+    </xs:element>
+    <xs:element name="DisplayName" type="xs:string"/>
+    <xs:element name="AccountId" type="xs:string"/>
+    <xs:element name="AccountType" type="xs:string"/>
+    <xs:element name="BDCAssociatedEntity">
+      <xs:complexType>
+        <xs:sequence>
+          <xs:element ref="pc:BDCEntity" minOccurs="0" maxOccurs="unbounded"/>
+        </xs:sequence>
+        <xs:attribute ref="pc:EntityNamespace"/>
+        <xs:attribute ref="pc:EntityName"/>
+        <xs:attribute ref="pc:SystemInstanceName"/>
+        <xs:attribute ref="pc:AssociationName"/>
+      </xs:complexType>
+    </xs:element>
+    <xs:attribute name="EntityNamespace" type="xs:string"/>
+    <xs:attribute name="EntityName" type="xs:string"/>
+    <xs:attribute name="SystemInstanceName" type="xs:string"/>
+    <xs:attribute name="AssociationName" type="xs:string"/>
+    <xs:element name="BDCEntity">
+      <xs:complexType>
+        <xs:sequence>
+          <xs:element ref="pc:EntityDisplayName" minOccurs="0"/>
+          <xs:element ref="pc:EntityInstanceReference" minOccurs="0"/>
+          <xs:element ref="pc:EntityId1" minOccurs="0"/>
+          <xs:element ref="pc:EntityId2" minOccurs="0"/>
+          <xs:element ref="pc:EntityId3" minOccurs="0"/>
+          <xs:element ref="pc:EntityId4" minOccurs="0"/>
+          <xs:element ref="pc:EntityId5" minOccurs="0"/>
+        </xs:sequence>
+      </xs:complexType>
+    </xs:element>
+    <xs:element name="EntityDisplayName" type="xs:string"/>
+    <xs:element name="EntityInstanceReference" type="xs:string"/>
+    <xs:element name="EntityId1" type="xs:string"/>
+    <xs:element name="EntityId2" type="xs:string"/>
+    <xs:element name="EntityId3" type="xs:string"/>
+    <xs:element name="EntityId4" type="xs:string"/>
+    <xs:element name="EntityId5" type="xs:string"/>
+    <xs:element name="Terms">
+      <xs:complexType>
+        <xs:sequence>
+          <xs:element ref="pc:TermInfo" minOccurs="0" maxOccurs="unbounded"/>
+        </xs:sequence>
+      </xs:complexType>
+    </xs:element>
+    <xs:element name="TermInfo">
+      <xs:complexType>
+        <xs:sequence>
+          <xs:element ref="pc:TermName" minOccurs="0"/>
+          <xs:element ref="pc:TermId" minOccurs="0"/>
+        </xs:sequence>
+      </xs:complexType>
+    </xs:element>
+    <xs:element name="TermName" type="xs:string"/>
+    <xs:element name="TermId" type="xs:string"/>
+  </xs:schema>
+</ct:contentTypeSchema>
+</file>
+
+<file path=customXml/item2.xml><?xml version="1.0" encoding="utf-8"?>
+<?mso-contentType ?>
+<FormTemplates xmlns="http://schemas.microsoft.com/sharepoint/v3/contenttype/forms">
+  <Display>DocumentLibraryForm</Display>
+  <Edit>DocumentLibraryForm</Edit>
+  <New>DocumentLibraryForm</New>
+</FormTemplates>
+</file>
+
+<file path=customXml/item3.xml><?xml version="1.0" encoding="utf-8"?>
+<p:properties xmlns:p="http://schemas.microsoft.com/office/2006/metadata/properties" xmlns:xsi="http://www.w3.org/2001/XMLSchema-instance" xmlns:pc="http://schemas.microsoft.com/office/infopath/2007/PartnerControls">
+  <documentManagement>
+    <lcf76f155ced4ddcb4097134ff3c332f xmlns="6f1de3ac-cc62-46a8-878b-50c2cb27ddd5">
+      <Terms xmlns="http://schemas.microsoft.com/office/infopath/2007/PartnerControls"/>
+    </lcf76f155ced4ddcb4097134ff3c332f>
+    <TaxCatchAll xmlns="9ae1974e-224e-4f33-b654-b9069661b295" xsi:nil="true"/>
+  </documentManagement>
+</p:properties>
+</file>
+
+<file path=customXml/itemProps1.xml><?xml version="1.0" encoding="utf-8"?>
+<ds:datastoreItem xmlns:ds="http://schemas.openxmlformats.org/officeDocument/2006/customXml" ds:itemID="{CEB0ED9F-0AAD-4A87-8B1D-97F82F97A7D2}">
+  <ds:schemaRefs>
+    <ds:schemaRef ds:uri="http://schemas.microsoft.com/office/2006/metadata/contentType"/>
+    <ds:schemaRef ds:uri="http://schemas.microsoft.com/office/2006/metadata/properties/metaAttributes"/>
+    <ds:schemaRef ds:uri="http://www.w3.org/2001/XMLSchema"/>
+    <ds:schemaRef ds:uri="http://schemas.microsoft.com/office/2006/metadata/properties"/>
+    <ds:schemaRef ds:uri="6f1de3ac-cc62-46a8-878b-50c2cb27ddd5"/>
+    <ds:schemaRef ds:uri="9ae1974e-224e-4f33-b654-b9069661b295"/>
+    <ds:schemaRef ds:uri="http://schemas.microsoft.com/office/2006/documentManagement/types"/>
+    <ds:schemaRef ds:uri="http://schemas.microsoft.com/office/infopath/2007/PartnerControls"/>
+    <ds:schemaRef ds:uri="http://schemas.openxmlformats.org/package/2006/metadata/core-properties"/>
+    <ds:schemaRef ds:uri="http://purl.org/dc/elements/1.1/"/>
+    <ds:schemaRef ds:uri="http://purl.org/dc/terms/"/>
+    <ds:schemaRef ds:uri="http://schemas.microsoft.com/internal/obd"/>
+  </ds:schemaRefs>
+</ds:datastoreItem>
+</file>
+
+<file path=customXml/itemProps2.xml><?xml version="1.0" encoding="utf-8"?>
+<ds:datastoreItem xmlns:ds="http://schemas.openxmlformats.org/officeDocument/2006/customXml" ds:itemID="{C618A4EA-761D-41C6-8B4F-878190B78133}">
+  <ds:schemaRefs>
+    <ds:schemaRef ds:uri="http://schemas.microsoft.com/sharepoint/v3/contenttype/forms"/>
+  </ds:schemaRefs>
+</ds:datastoreItem>
+</file>
+
+<file path=customXml/itemProps3.xml><?xml version="1.0" encoding="utf-8"?>
+<ds:datastoreItem xmlns:ds="http://schemas.openxmlformats.org/officeDocument/2006/customXml" ds:itemID="{4BF4A061-2E4F-43EF-BEE2-A9195234C7A4}">
+  <ds:schemaRefs>
+    <ds:schemaRef ds:uri="http://schemas.microsoft.com/office/2006/metadata/properties"/>
+    <ds:schemaRef ds:uri="http://schemas.microsoft.com/office/infopath/2007/PartnerControls"/>
+    <ds:schemaRef ds:uri="6f1de3ac-cc62-46a8-878b-50c2cb27ddd5"/>
+    <ds:schemaRef ds:uri="9ae1974e-224e-4f33-b654-b9069661b295"/>
+  </ds:schemaRefs>
+</ds:datastoreItem>
 </file>
</xml_diff>

<commit_message>
fix: add new information - 2026.1
</commit_message>
<xml_diff>
--- a/Aula 1/Apresentação da Disciplina.pptx
+++ b/Aula 1/Apresentação da Disciplina.pptx
@@ -211,7 +211,7 @@
           <a:p>
             <a:fld id="{81867862-F293-410A-9EF8-8D63CAE1D586}" type="datetimeFigureOut">
               <a:rPr lang="pt-BR" smtClean="0"/>
-              <a:t>07/08/2025</a:t>
+              <a:t>20/01/2026</a:t>
             </a:fld>
             <a:endParaRPr lang="pt-BR"/>
           </a:p>
@@ -709,7 +709,7 @@
           <a:p>
             <a:fld id="{1FAE8E12-6BC5-4DF0-9F0C-529E65D73EBB}" type="datetimeFigureOut">
               <a:rPr lang="pt-BR" smtClean="0"/>
-              <a:t>07/08/2025</a:t>
+              <a:t>20/01/2026</a:t>
             </a:fld>
             <a:endParaRPr lang="pt-BR"/>
           </a:p>
@@ -907,7 +907,7 @@
           <a:p>
             <a:fld id="{1FAE8E12-6BC5-4DF0-9F0C-529E65D73EBB}" type="datetimeFigureOut">
               <a:rPr lang="pt-BR" smtClean="0"/>
-              <a:t>07/08/2025</a:t>
+              <a:t>20/01/2026</a:t>
             </a:fld>
             <a:endParaRPr lang="pt-BR"/>
           </a:p>
@@ -1115,7 +1115,7 @@
           <a:p>
             <a:fld id="{1FAE8E12-6BC5-4DF0-9F0C-529E65D73EBB}" type="datetimeFigureOut">
               <a:rPr lang="pt-BR" smtClean="0"/>
-              <a:t>07/08/2025</a:t>
+              <a:t>20/01/2026</a:t>
             </a:fld>
             <a:endParaRPr lang="pt-BR"/>
           </a:p>
@@ -1313,7 +1313,7 @@
           <a:p>
             <a:fld id="{1FAE8E12-6BC5-4DF0-9F0C-529E65D73EBB}" type="datetimeFigureOut">
               <a:rPr lang="pt-BR" smtClean="0"/>
-              <a:t>07/08/2025</a:t>
+              <a:t>20/01/2026</a:t>
             </a:fld>
             <a:endParaRPr lang="pt-BR"/>
           </a:p>
@@ -1588,7 +1588,7 @@
           <a:p>
             <a:fld id="{1FAE8E12-6BC5-4DF0-9F0C-529E65D73EBB}" type="datetimeFigureOut">
               <a:rPr lang="pt-BR" smtClean="0"/>
-              <a:t>07/08/2025</a:t>
+              <a:t>20/01/2026</a:t>
             </a:fld>
             <a:endParaRPr lang="pt-BR"/>
           </a:p>
@@ -1853,7 +1853,7 @@
           <a:p>
             <a:fld id="{1FAE8E12-6BC5-4DF0-9F0C-529E65D73EBB}" type="datetimeFigureOut">
               <a:rPr lang="pt-BR" smtClean="0"/>
-              <a:t>07/08/2025</a:t>
+              <a:t>20/01/2026</a:t>
             </a:fld>
             <a:endParaRPr lang="pt-BR"/>
           </a:p>
@@ -2265,7 +2265,7 @@
           <a:p>
             <a:fld id="{1FAE8E12-6BC5-4DF0-9F0C-529E65D73EBB}" type="datetimeFigureOut">
               <a:rPr lang="pt-BR" smtClean="0"/>
-              <a:t>07/08/2025</a:t>
+              <a:t>20/01/2026</a:t>
             </a:fld>
             <a:endParaRPr lang="pt-BR"/>
           </a:p>
@@ -2406,7 +2406,7 @@
           <a:p>
             <a:fld id="{1FAE8E12-6BC5-4DF0-9F0C-529E65D73EBB}" type="datetimeFigureOut">
               <a:rPr lang="pt-BR" smtClean="0"/>
-              <a:t>07/08/2025</a:t>
+              <a:t>20/01/2026</a:t>
             </a:fld>
             <a:endParaRPr lang="pt-BR"/>
           </a:p>
@@ -2519,7 +2519,7 @@
           <a:p>
             <a:fld id="{1FAE8E12-6BC5-4DF0-9F0C-529E65D73EBB}" type="datetimeFigureOut">
               <a:rPr lang="pt-BR" smtClean="0"/>
-              <a:t>07/08/2025</a:t>
+              <a:t>20/01/2026</a:t>
             </a:fld>
             <a:endParaRPr lang="pt-BR"/>
           </a:p>
@@ -2830,7 +2830,7 @@
           <a:p>
             <a:fld id="{1FAE8E12-6BC5-4DF0-9F0C-529E65D73EBB}" type="datetimeFigureOut">
               <a:rPr lang="pt-BR" smtClean="0"/>
-              <a:t>07/08/2025</a:t>
+              <a:t>20/01/2026</a:t>
             </a:fld>
             <a:endParaRPr lang="pt-BR"/>
           </a:p>
@@ -3118,7 +3118,7 @@
           <a:p>
             <a:fld id="{1FAE8E12-6BC5-4DF0-9F0C-529E65D73EBB}" type="datetimeFigureOut">
               <a:rPr lang="pt-BR" smtClean="0"/>
-              <a:t>07/08/2025</a:t>
+              <a:t>20/01/2026</a:t>
             </a:fld>
             <a:endParaRPr lang="pt-BR"/>
           </a:p>
@@ -3359,7 +3359,7 @@
           <a:p>
             <a:fld id="{1FAE8E12-6BC5-4DF0-9F0C-529E65D73EBB}" type="datetimeFigureOut">
               <a:rPr lang="pt-BR" smtClean="0"/>
-              <a:t>07/08/2025</a:t>
+              <a:t>20/01/2026</a:t>
             </a:fld>
             <a:endParaRPr lang="pt-BR"/>
           </a:p>
@@ -4097,15 +4097,11 @@
             </a:r>
             <a:r>
               <a:rPr lang="en-US" sz="2400" dirty="0"/>
-              <a:t>: </a:t>
+              <a:t>: A </a:t>
             </a:r>
             <a:r>
               <a:rPr lang="en-US" sz="2400" dirty="0" err="1"/>
-              <a:t>Terça</a:t>
-            </a:r>
-            <a:r>
-              <a:rPr lang="en-US" sz="2400" dirty="0"/>
-              <a:t>-Feira 15h30</a:t>
+              <a:t>Definir</a:t>
             </a:r>
             <a:endParaRPr lang="en-US" sz="2400" dirty="0">
               <a:ea typeface="Calibri"/>
@@ -4135,11 +4131,11 @@
               <a:buChar char="Ø"/>
             </a:pPr>
             <a:r>
-              <a:rPr lang="en-US" sz="2400" err="1"/>
+              <a:rPr lang="en-US" sz="2400" dirty="0" err="1"/>
               <a:t>Github</a:t>
             </a:r>
             <a:r>
-              <a:rPr lang="en-US" sz="2400"/>
+              <a:rPr lang="en-US" sz="2400" dirty="0"/>
               <a:t>: </a:t>
             </a:r>
             <a:r>
@@ -4149,10 +4145,6 @@
               </a:rPr>
               <a:t>https://github.com/Felipe-Tagawa</a:t>
             </a:r>
-            <a:endParaRPr lang="en-US" sz="2400">
-              <a:ea typeface="+mn-lt"/>
-              <a:cs typeface="+mn-lt"/>
-            </a:endParaRPr>
           </a:p>
         </p:txBody>
       </p:sp>
@@ -5043,10 +5035,10 @@
       </p:sp>
       <p:pic>
         <p:nvPicPr>
-          <p:cNvPr id="7" name="Imagem 6">
-            <a:extLst>
-              <a:ext uri="{FF2B5EF4-FFF2-40B4-BE49-F238E27FC236}">
-                <a16:creationId xmlns:a16="http://schemas.microsoft.com/office/drawing/2014/main" id="{04B5471A-DAA8-2F18-EC43-4525503A6EAB}"/>
+          <p:cNvPr id="9" name="Imagem 8">
+            <a:extLst>
+              <a:ext uri="{FF2B5EF4-FFF2-40B4-BE49-F238E27FC236}">
+                <a16:creationId xmlns:a16="http://schemas.microsoft.com/office/drawing/2014/main" id="{21A44248-8BDC-3CFE-3D97-21271615B345}"/>
               </a:ext>
             </a:extLst>
           </p:cNvPr>
@@ -5063,8 +5055,8 @@
         </p:blipFill>
         <p:spPr>
           <a:xfrm>
-            <a:off x="2607729" y="1310848"/>
-            <a:ext cx="6976541" cy="4810271"/>
+            <a:off x="2597833" y="1029267"/>
+            <a:ext cx="6996333" cy="4799465"/>
           </a:xfrm>
           <a:prstGeom prst="rect">
             <a:avLst/>
@@ -6458,15 +6450,6 @@
 </file>
 
 <file path=customXml/item2.xml><?xml version="1.0" encoding="utf-8"?>
-<?mso-contentType ?>
-<FormTemplates xmlns="http://schemas.microsoft.com/sharepoint/v3/contenttype/forms">
-  <Display>DocumentLibraryForm</Display>
-  <Edit>DocumentLibraryForm</Edit>
-  <New>DocumentLibraryForm</New>
-</FormTemplates>
-</file>
-
-<file path=customXml/item3.xml><?xml version="1.0" encoding="utf-8"?>
 <p:properties xmlns:p="http://schemas.microsoft.com/office/2006/metadata/properties" xmlns:xsi="http://www.w3.org/2001/XMLSchema-instance" xmlns:pc="http://schemas.microsoft.com/office/infopath/2007/PartnerControls">
   <documentManagement>
     <lcf76f155ced4ddcb4097134ff3c332f xmlns="6f1de3ac-cc62-46a8-878b-50c2cb27ddd5">
@@ -6475,6 +6458,15 @@
     <TaxCatchAll xmlns="9ae1974e-224e-4f33-b654-b9069661b295" xsi:nil="true"/>
   </documentManagement>
 </p:properties>
+</file>
+
+<file path=customXml/item3.xml><?xml version="1.0" encoding="utf-8"?>
+<?mso-contentType ?>
+<FormTemplates xmlns="http://schemas.microsoft.com/sharepoint/v3/contenttype/forms">
+  <Display>DocumentLibraryForm</Display>
+  <Edit>DocumentLibraryForm</Edit>
+  <New>DocumentLibraryForm</New>
+</FormTemplates>
 </file>
 
 <file path=customXml/itemProps1.xml><?xml version="1.0" encoding="utf-8"?>
@@ -6497,14 +6489,6 @@
 </file>
 
 <file path=customXml/itemProps2.xml><?xml version="1.0" encoding="utf-8"?>
-<ds:datastoreItem xmlns:ds="http://schemas.openxmlformats.org/officeDocument/2006/customXml" ds:itemID="{C618A4EA-761D-41C6-8B4F-878190B78133}">
-  <ds:schemaRefs>
-    <ds:schemaRef ds:uri="http://schemas.microsoft.com/sharepoint/v3/contenttype/forms"/>
-  </ds:schemaRefs>
-</ds:datastoreItem>
-</file>
-
-<file path=customXml/itemProps3.xml><?xml version="1.0" encoding="utf-8"?>
 <ds:datastoreItem xmlns:ds="http://schemas.openxmlformats.org/officeDocument/2006/customXml" ds:itemID="{4BF4A061-2E4F-43EF-BEE2-A9195234C7A4}">
   <ds:schemaRefs>
     <ds:schemaRef ds:uri="http://schemas.microsoft.com/office/2006/metadata/properties"/>
@@ -6513,4 +6497,12 @@
     <ds:schemaRef ds:uri="9ae1974e-224e-4f33-b654-b9069661b295"/>
   </ds:schemaRefs>
 </ds:datastoreItem>
+</file>
+
+<file path=customXml/itemProps3.xml><?xml version="1.0" encoding="utf-8"?>
+<ds:datastoreItem xmlns:ds="http://schemas.openxmlformats.org/officeDocument/2006/customXml" ds:itemID="{C618A4EA-761D-41C6-8B4F-878190B78133}">
+  <ds:schemaRefs>
+    <ds:schemaRef ds:uri="http://schemas.microsoft.com/sharepoint/v3/contenttype/forms"/>
+  </ds:schemaRefs>
+</ds:datastoreItem>
 </file>
</xml_diff>

<commit_message>
fix: bigger fonts to better visualization in `Aula 1`
</commit_message>
<xml_diff>
--- a/Aula 1/Apresentação da Disciplina.pptx
+++ b/Aula 1/Apresentação da Disciplina.pptx
@@ -211,7 +211,7 @@
           <a:p>
             <a:fld id="{81867862-F293-410A-9EF8-8D63CAE1D586}" type="datetimeFigureOut">
               <a:rPr lang="pt-BR" smtClean="0"/>
-              <a:t>20/01/2026</a:t>
+              <a:t>12/02/2026</a:t>
             </a:fld>
             <a:endParaRPr lang="pt-BR"/>
           </a:p>
@@ -709,7 +709,7 @@
           <a:p>
             <a:fld id="{1FAE8E12-6BC5-4DF0-9F0C-529E65D73EBB}" type="datetimeFigureOut">
               <a:rPr lang="pt-BR" smtClean="0"/>
-              <a:t>20/01/2026</a:t>
+              <a:t>12/02/2026</a:t>
             </a:fld>
             <a:endParaRPr lang="pt-BR"/>
           </a:p>
@@ -907,7 +907,7 @@
           <a:p>
             <a:fld id="{1FAE8E12-6BC5-4DF0-9F0C-529E65D73EBB}" type="datetimeFigureOut">
               <a:rPr lang="pt-BR" smtClean="0"/>
-              <a:t>20/01/2026</a:t>
+              <a:t>12/02/2026</a:t>
             </a:fld>
             <a:endParaRPr lang="pt-BR"/>
           </a:p>
@@ -1115,7 +1115,7 @@
           <a:p>
             <a:fld id="{1FAE8E12-6BC5-4DF0-9F0C-529E65D73EBB}" type="datetimeFigureOut">
               <a:rPr lang="pt-BR" smtClean="0"/>
-              <a:t>20/01/2026</a:t>
+              <a:t>12/02/2026</a:t>
             </a:fld>
             <a:endParaRPr lang="pt-BR"/>
           </a:p>
@@ -1313,7 +1313,7 @@
           <a:p>
             <a:fld id="{1FAE8E12-6BC5-4DF0-9F0C-529E65D73EBB}" type="datetimeFigureOut">
               <a:rPr lang="pt-BR" smtClean="0"/>
-              <a:t>20/01/2026</a:t>
+              <a:t>12/02/2026</a:t>
             </a:fld>
             <a:endParaRPr lang="pt-BR"/>
           </a:p>
@@ -1588,7 +1588,7 @@
           <a:p>
             <a:fld id="{1FAE8E12-6BC5-4DF0-9F0C-529E65D73EBB}" type="datetimeFigureOut">
               <a:rPr lang="pt-BR" smtClean="0"/>
-              <a:t>20/01/2026</a:t>
+              <a:t>12/02/2026</a:t>
             </a:fld>
             <a:endParaRPr lang="pt-BR"/>
           </a:p>
@@ -1853,7 +1853,7 @@
           <a:p>
             <a:fld id="{1FAE8E12-6BC5-4DF0-9F0C-529E65D73EBB}" type="datetimeFigureOut">
               <a:rPr lang="pt-BR" smtClean="0"/>
-              <a:t>20/01/2026</a:t>
+              <a:t>12/02/2026</a:t>
             </a:fld>
             <a:endParaRPr lang="pt-BR"/>
           </a:p>
@@ -2265,7 +2265,7 @@
           <a:p>
             <a:fld id="{1FAE8E12-6BC5-4DF0-9F0C-529E65D73EBB}" type="datetimeFigureOut">
               <a:rPr lang="pt-BR" smtClean="0"/>
-              <a:t>20/01/2026</a:t>
+              <a:t>12/02/2026</a:t>
             </a:fld>
             <a:endParaRPr lang="pt-BR"/>
           </a:p>
@@ -2406,7 +2406,7 @@
           <a:p>
             <a:fld id="{1FAE8E12-6BC5-4DF0-9F0C-529E65D73EBB}" type="datetimeFigureOut">
               <a:rPr lang="pt-BR" smtClean="0"/>
-              <a:t>20/01/2026</a:t>
+              <a:t>12/02/2026</a:t>
             </a:fld>
             <a:endParaRPr lang="pt-BR"/>
           </a:p>
@@ -2519,7 +2519,7 @@
           <a:p>
             <a:fld id="{1FAE8E12-6BC5-4DF0-9F0C-529E65D73EBB}" type="datetimeFigureOut">
               <a:rPr lang="pt-BR" smtClean="0"/>
-              <a:t>20/01/2026</a:t>
+              <a:t>12/02/2026</a:t>
             </a:fld>
             <a:endParaRPr lang="pt-BR"/>
           </a:p>
@@ -2830,7 +2830,7 @@
           <a:p>
             <a:fld id="{1FAE8E12-6BC5-4DF0-9F0C-529E65D73EBB}" type="datetimeFigureOut">
               <a:rPr lang="pt-BR" smtClean="0"/>
-              <a:t>20/01/2026</a:t>
+              <a:t>12/02/2026</a:t>
             </a:fld>
             <a:endParaRPr lang="pt-BR"/>
           </a:p>
@@ -3118,7 +3118,7 @@
           <a:p>
             <a:fld id="{1FAE8E12-6BC5-4DF0-9F0C-529E65D73EBB}" type="datetimeFigureOut">
               <a:rPr lang="pt-BR" smtClean="0"/>
-              <a:t>20/01/2026</a:t>
+              <a:t>12/02/2026</a:t>
             </a:fld>
             <a:endParaRPr lang="pt-BR"/>
           </a:p>
@@ -3359,7 +3359,7 @@
           <a:p>
             <a:fld id="{1FAE8E12-6BC5-4DF0-9F0C-529E65D73EBB}" type="datetimeFigureOut">
               <a:rPr lang="pt-BR" smtClean="0"/>
-              <a:t>20/01/2026</a:t>
+              <a:t>12/02/2026</a:t>
             </a:fld>
             <a:endParaRPr lang="pt-BR"/>
           </a:p>
@@ -6261,6 +6261,26 @@
 </file>
 
 <file path=customXml/item1.xml><?xml version="1.0" encoding="utf-8"?>
+<?mso-contentType ?>
+<FormTemplates xmlns="http://schemas.microsoft.com/sharepoint/v3/contenttype/forms">
+  <Display>DocumentLibraryForm</Display>
+  <Edit>DocumentLibraryForm</Edit>
+  <New>DocumentLibraryForm</New>
+</FormTemplates>
+</file>
+
+<file path=customXml/item2.xml><?xml version="1.0" encoding="utf-8"?>
+<p:properties xmlns:p="http://schemas.microsoft.com/office/2006/metadata/properties" xmlns:xsi="http://www.w3.org/2001/XMLSchema-instance" xmlns:pc="http://schemas.microsoft.com/office/infopath/2007/PartnerControls">
+  <documentManagement>
+    <lcf76f155ced4ddcb4097134ff3c332f xmlns="6f1de3ac-cc62-46a8-878b-50c2cb27ddd5">
+      <Terms xmlns="http://schemas.microsoft.com/office/infopath/2007/PartnerControls"/>
+    </lcf76f155ced4ddcb4097134ff3c332f>
+    <TaxCatchAll xmlns="9ae1974e-224e-4f33-b654-b9069661b295" xsi:nil="true"/>
+  </documentManagement>
+</p:properties>
+</file>
+
+<file path=customXml/item3.xml><?xml version="1.0" encoding="utf-8"?>
 <ct:contentTypeSchema xmlns:ct="http://schemas.microsoft.com/office/2006/metadata/contentType" xmlns:ma="http://schemas.microsoft.com/office/2006/metadata/properties/metaAttributes" ct:_="" ma:_="" ma:contentTypeName="Document" ma:contentTypeID="0x01010063712E170922C849903EEEDCF4FADC11" ma:contentTypeVersion="10" ma:contentTypeDescription="Create a new document." ma:contentTypeScope="" ma:versionID="9ca76f3d6fd902564539b0a341b08038">
   <xsd:schema xmlns:xsd="http://www.w3.org/2001/XMLSchema" xmlns:xs="http://www.w3.org/2001/XMLSchema" xmlns:p="http://schemas.microsoft.com/office/2006/metadata/properties" xmlns:ns2="6f1de3ac-cc62-46a8-878b-50c2cb27ddd5" xmlns:ns3="9ae1974e-224e-4f33-b654-b9069661b295" targetNamespace="http://schemas.microsoft.com/office/2006/metadata/properties" ma:root="true" ma:fieldsID="3b1c48a9e619a27b5cd698fb7d458a10" ns2:_="" ns3:_="">
     <xsd:import namespace="6f1de3ac-cc62-46a8-878b-50c2cb27ddd5"/>
@@ -6449,27 +6469,26 @@
 </ct:contentTypeSchema>
 </file>
 
-<file path=customXml/item2.xml><?xml version="1.0" encoding="utf-8"?>
-<p:properties xmlns:p="http://schemas.microsoft.com/office/2006/metadata/properties" xmlns:xsi="http://www.w3.org/2001/XMLSchema-instance" xmlns:pc="http://schemas.microsoft.com/office/infopath/2007/PartnerControls">
-  <documentManagement>
-    <lcf76f155ced4ddcb4097134ff3c332f xmlns="6f1de3ac-cc62-46a8-878b-50c2cb27ddd5">
-      <Terms xmlns="http://schemas.microsoft.com/office/infopath/2007/PartnerControls"/>
-    </lcf76f155ced4ddcb4097134ff3c332f>
-    <TaxCatchAll xmlns="9ae1974e-224e-4f33-b654-b9069661b295" xsi:nil="true"/>
-  </documentManagement>
-</p:properties>
+<file path=customXml/itemProps1.xml><?xml version="1.0" encoding="utf-8"?>
+<ds:datastoreItem xmlns:ds="http://schemas.openxmlformats.org/officeDocument/2006/customXml" ds:itemID="{C618A4EA-761D-41C6-8B4F-878190B78133}">
+  <ds:schemaRefs>
+    <ds:schemaRef ds:uri="http://schemas.microsoft.com/sharepoint/v3/contenttype/forms"/>
+  </ds:schemaRefs>
+</ds:datastoreItem>
 </file>
 
-<file path=customXml/item3.xml><?xml version="1.0" encoding="utf-8"?>
-<?mso-contentType ?>
-<FormTemplates xmlns="http://schemas.microsoft.com/sharepoint/v3/contenttype/forms">
-  <Display>DocumentLibraryForm</Display>
-  <Edit>DocumentLibraryForm</Edit>
-  <New>DocumentLibraryForm</New>
-</FormTemplates>
+<file path=customXml/itemProps2.xml><?xml version="1.0" encoding="utf-8"?>
+<ds:datastoreItem xmlns:ds="http://schemas.openxmlformats.org/officeDocument/2006/customXml" ds:itemID="{4BF4A061-2E4F-43EF-BEE2-A9195234C7A4}">
+  <ds:schemaRefs>
+    <ds:schemaRef ds:uri="http://schemas.microsoft.com/office/2006/metadata/properties"/>
+    <ds:schemaRef ds:uri="http://schemas.microsoft.com/office/infopath/2007/PartnerControls"/>
+    <ds:schemaRef ds:uri="6f1de3ac-cc62-46a8-878b-50c2cb27ddd5"/>
+    <ds:schemaRef ds:uri="9ae1974e-224e-4f33-b654-b9069661b295"/>
+  </ds:schemaRefs>
+</ds:datastoreItem>
 </file>
 
-<file path=customXml/itemProps1.xml><?xml version="1.0" encoding="utf-8"?>
+<file path=customXml/itemProps3.xml><?xml version="1.0" encoding="utf-8"?>
 <ds:datastoreItem xmlns:ds="http://schemas.openxmlformats.org/officeDocument/2006/customXml" ds:itemID="{CEB0ED9F-0AAD-4A87-8B1D-97F82F97A7D2}">
   <ds:schemaRefs>
     <ds:schemaRef ds:uri="http://schemas.microsoft.com/office/2006/metadata/contentType"/>
@@ -6486,23 +6505,4 @@
     <ds:schemaRef ds:uri="http://schemas.microsoft.com/internal/obd"/>
   </ds:schemaRefs>
 </ds:datastoreItem>
-</file>
-
-<file path=customXml/itemProps2.xml><?xml version="1.0" encoding="utf-8"?>
-<ds:datastoreItem xmlns:ds="http://schemas.openxmlformats.org/officeDocument/2006/customXml" ds:itemID="{4BF4A061-2E4F-43EF-BEE2-A9195234C7A4}">
-  <ds:schemaRefs>
-    <ds:schemaRef ds:uri="http://schemas.microsoft.com/office/2006/metadata/properties"/>
-    <ds:schemaRef ds:uri="http://schemas.microsoft.com/office/infopath/2007/PartnerControls"/>
-    <ds:schemaRef ds:uri="6f1de3ac-cc62-46a8-878b-50c2cb27ddd5"/>
-    <ds:schemaRef ds:uri="9ae1974e-224e-4f33-b654-b9069661b295"/>
-  </ds:schemaRefs>
-</ds:datastoreItem>
-</file>
-
-<file path=customXml/itemProps3.xml><?xml version="1.0" encoding="utf-8"?>
-<ds:datastoreItem xmlns:ds="http://schemas.openxmlformats.org/officeDocument/2006/customXml" ds:itemID="{C618A4EA-761D-41C6-8B4F-878190B78133}">
-  <ds:schemaRefs>
-    <ds:schemaRef ds:uri="http://schemas.microsoft.com/sharepoint/v3/contenttype/forms"/>
-  </ds:schemaRefs>
-</ds:datastoreItem>
 </file>
</xml_diff>